<commit_message>
Avg. Monthly Earnings Project - Navigation, Chart settings, Footer, Overview background implemented
</commit_message>
<xml_diff>
--- a/PowerBI/Projects/Average Monthly Earnings EU/Backgrounds/Backgrounds.pptx
+++ b/PowerBI/Projects/Average Monthly Earnings EU/Backgrounds/Backgrounds.pptx
@@ -2,12 +2,13 @@
 <file path=ppt/presentation.xml><?xml version="1.0" encoding="utf-8"?>
 <p:presentation xmlns:a="http://schemas.openxmlformats.org/drawingml/2006/main" xmlns:r="http://schemas.openxmlformats.org/officeDocument/2006/relationships" xmlns:p="http://schemas.openxmlformats.org/presentationml/2006/main" saveSubsetFonts="1">
   <p:sldMasterIdLst>
-    <p:sldMasterId id="2147483660" r:id="rId1"/>
+    <p:sldMasterId id="2147483672" r:id="rId1"/>
   </p:sldMasterIdLst>
   <p:sldIdLst>
-    <p:sldId id="256" r:id="rId2"/>
+    <p:sldId id="257" r:id="rId2"/>
+    <p:sldId id="256" r:id="rId3"/>
   </p:sldIdLst>
-  <p:sldSz cx="9525000" cy="14287500"/>
+  <p:sldSz cx="9525000" cy="29384625"/>
   <p:notesSz cx="6858000" cy="9144000"/>
   <p:defaultTextStyle>
     <a:defPPr>
@@ -104,6 +105,11 @@
       </a:defRPr>
     </a:lvl9pPr>
   </p:defaultTextStyle>
+  <p:extLst>
+    <p:ext uri="{EFAFB233-063F-42B5-8137-9DF3F51BA10A}">
+      <p15:sldGuideLst xmlns:p15="http://schemas.microsoft.com/office/powerpoint/2012/main"/>
+    </p:ext>
+  </p:extLst>
 </p:presentation>
 </file>
 
@@ -136,8 +142,8 @@
         </p:nvSpPr>
         <p:spPr>
           <a:xfrm>
-            <a:off x="714375" y="2338256"/>
-            <a:ext cx="8096250" cy="4974167"/>
+            <a:off x="714375" y="4809014"/>
+            <a:ext cx="8096250" cy="10230203"/>
           </a:xfrm>
         </p:spPr>
         <p:txBody>
@@ -168,8 +174,8 @@
         </p:nvSpPr>
         <p:spPr>
           <a:xfrm>
-            <a:off x="1190625" y="7504246"/>
-            <a:ext cx="7143750" cy="3449504"/>
+            <a:off x="1190625" y="15433732"/>
+            <a:ext cx="7143750" cy="7094480"/>
           </a:xfrm>
         </p:spPr>
         <p:txBody>
@@ -238,7 +244,7 @@
           <a:p>
             <a:fld id="{2AE88528-DDCC-4DB1-844C-DD3FEDD6CA17}" type="datetimeFigureOut">
               <a:rPr lang="pl-PL" smtClean="0"/>
-              <a:t>2024-01-29</a:t>
+              <a:t>2024-02-04</a:t>
             </a:fld>
             <a:endParaRPr lang="pl-PL"/>
           </a:p>
@@ -289,7 +295,7 @@
     </p:spTree>
     <p:extLst>
       <p:ext uri="{BB962C8B-B14F-4D97-AF65-F5344CB8AC3E}">
-        <p14:creationId xmlns:p14="http://schemas.microsoft.com/office/powerpoint/2010/main" val="3020548047"/>
+        <p14:creationId xmlns:p14="http://schemas.microsoft.com/office/powerpoint/2010/main" val="1614919307"/>
       </p:ext>
     </p:extLst>
   </p:cSld>
@@ -408,7 +414,7 @@
           <a:p>
             <a:fld id="{2AE88528-DDCC-4DB1-844C-DD3FEDD6CA17}" type="datetimeFigureOut">
               <a:rPr lang="pl-PL" smtClean="0"/>
-              <a:t>2024-01-29</a:t>
+              <a:t>2024-02-04</a:t>
             </a:fld>
             <a:endParaRPr lang="pl-PL"/>
           </a:p>
@@ -459,7 +465,7 @@
     </p:spTree>
     <p:extLst>
       <p:ext uri="{BB962C8B-B14F-4D97-AF65-F5344CB8AC3E}">
-        <p14:creationId xmlns:p14="http://schemas.microsoft.com/office/powerpoint/2010/main" val="195221850"/>
+        <p14:creationId xmlns:p14="http://schemas.microsoft.com/office/powerpoint/2010/main" val="806416462"/>
       </p:ext>
     </p:extLst>
   </p:cSld>
@@ -498,8 +504,8 @@
         </p:nvSpPr>
         <p:spPr>
           <a:xfrm>
-            <a:off x="6816329" y="760677"/>
-            <a:ext cx="2053828" cy="12107996"/>
+            <a:off x="6816329" y="1564459"/>
+            <a:ext cx="2053828" cy="24902111"/>
           </a:xfrm>
         </p:spPr>
         <p:txBody>
@@ -526,8 +532,8 @@
         </p:nvSpPr>
         <p:spPr>
           <a:xfrm>
-            <a:off x="654844" y="760677"/>
-            <a:ext cx="6042422" cy="12107996"/>
+            <a:off x="654844" y="1564459"/>
+            <a:ext cx="6042422" cy="24902111"/>
           </a:xfrm>
         </p:spPr>
         <p:txBody>
@@ -588,7 +594,7 @@
           <a:p>
             <a:fld id="{2AE88528-DDCC-4DB1-844C-DD3FEDD6CA17}" type="datetimeFigureOut">
               <a:rPr lang="pl-PL" smtClean="0"/>
-              <a:t>2024-01-29</a:t>
+              <a:t>2024-02-04</a:t>
             </a:fld>
             <a:endParaRPr lang="pl-PL"/>
           </a:p>
@@ -639,7 +645,7 @@
     </p:spTree>
     <p:extLst>
       <p:ext uri="{BB962C8B-B14F-4D97-AF65-F5344CB8AC3E}">
-        <p14:creationId xmlns:p14="http://schemas.microsoft.com/office/powerpoint/2010/main" val="3265328423"/>
+        <p14:creationId xmlns:p14="http://schemas.microsoft.com/office/powerpoint/2010/main" val="1424889307"/>
       </p:ext>
     </p:extLst>
   </p:cSld>
@@ -758,7 +764,7 @@
           <a:p>
             <a:fld id="{2AE88528-DDCC-4DB1-844C-DD3FEDD6CA17}" type="datetimeFigureOut">
               <a:rPr lang="pl-PL" smtClean="0"/>
-              <a:t>2024-01-29</a:t>
+              <a:t>2024-02-04</a:t>
             </a:fld>
             <a:endParaRPr lang="pl-PL"/>
           </a:p>
@@ -809,7 +815,7 @@
     </p:spTree>
     <p:extLst>
       <p:ext uri="{BB962C8B-B14F-4D97-AF65-F5344CB8AC3E}">
-        <p14:creationId xmlns:p14="http://schemas.microsoft.com/office/powerpoint/2010/main" val="1507241575"/>
+        <p14:creationId xmlns:p14="http://schemas.microsoft.com/office/powerpoint/2010/main" val="3635537566"/>
       </p:ext>
     </p:extLst>
   </p:cSld>
@@ -848,8 +854,8 @@
         </p:nvSpPr>
         <p:spPr>
           <a:xfrm>
-            <a:off x="649883" y="3561957"/>
-            <a:ext cx="8215313" cy="5943202"/>
+            <a:off x="649883" y="7325759"/>
+            <a:ext cx="8215313" cy="12223186"/>
           </a:xfrm>
         </p:spPr>
         <p:txBody>
@@ -880,8 +886,8 @@
         </p:nvSpPr>
         <p:spPr>
           <a:xfrm>
-            <a:off x="649883" y="9561384"/>
-            <a:ext cx="8215313" cy="3125390"/>
+            <a:off x="649883" y="19664580"/>
+            <a:ext cx="8215313" cy="6427885"/>
           </a:xfrm>
         </p:spPr>
         <p:txBody>
@@ -1002,7 +1008,7 @@
           <a:p>
             <a:fld id="{2AE88528-DDCC-4DB1-844C-DD3FEDD6CA17}" type="datetimeFigureOut">
               <a:rPr lang="pl-PL" smtClean="0"/>
-              <a:t>2024-01-29</a:t>
+              <a:t>2024-02-04</a:t>
             </a:fld>
             <a:endParaRPr lang="pl-PL"/>
           </a:p>
@@ -1053,7 +1059,7 @@
     </p:spTree>
     <p:extLst>
       <p:ext uri="{BB962C8B-B14F-4D97-AF65-F5344CB8AC3E}">
-        <p14:creationId xmlns:p14="http://schemas.microsoft.com/office/powerpoint/2010/main" val="2642154620"/>
+        <p14:creationId xmlns:p14="http://schemas.microsoft.com/office/powerpoint/2010/main" val="2906212324"/>
       </p:ext>
     </p:extLst>
   </p:cSld>
@@ -1115,8 +1121,8 @@
         </p:nvSpPr>
         <p:spPr>
           <a:xfrm>
-            <a:off x="654844" y="3803385"/>
-            <a:ext cx="4048125" cy="9065288"/>
+            <a:off x="654844" y="7822296"/>
+            <a:ext cx="4048125" cy="18644275"/>
           </a:xfrm>
         </p:spPr>
         <p:txBody>
@@ -1172,8 +1178,8 @@
         </p:nvSpPr>
         <p:spPr>
           <a:xfrm>
-            <a:off x="4822031" y="3803385"/>
-            <a:ext cx="4048125" cy="9065288"/>
+            <a:off x="4822031" y="7822296"/>
+            <a:ext cx="4048125" cy="18644275"/>
           </a:xfrm>
         </p:spPr>
         <p:txBody>
@@ -1234,7 +1240,7 @@
           <a:p>
             <a:fld id="{2AE88528-DDCC-4DB1-844C-DD3FEDD6CA17}" type="datetimeFigureOut">
               <a:rPr lang="pl-PL" smtClean="0"/>
-              <a:t>2024-01-29</a:t>
+              <a:t>2024-02-04</a:t>
             </a:fld>
             <a:endParaRPr lang="pl-PL"/>
           </a:p>
@@ -1285,7 +1291,7 @@
     </p:spTree>
     <p:extLst>
       <p:ext uri="{BB962C8B-B14F-4D97-AF65-F5344CB8AC3E}">
-        <p14:creationId xmlns:p14="http://schemas.microsoft.com/office/powerpoint/2010/main" val="3784796960"/>
+        <p14:creationId xmlns:p14="http://schemas.microsoft.com/office/powerpoint/2010/main" val="4024440129"/>
       </p:ext>
     </p:extLst>
   </p:cSld>
@@ -1324,8 +1330,8 @@
         </p:nvSpPr>
         <p:spPr>
           <a:xfrm>
-            <a:off x="656084" y="760680"/>
-            <a:ext cx="8215313" cy="2761590"/>
+            <a:off x="656084" y="1564466"/>
+            <a:ext cx="8215313" cy="5679669"/>
           </a:xfrm>
         </p:spPr>
         <p:txBody>
@@ -1352,8 +1358,8 @@
         </p:nvSpPr>
         <p:spPr>
           <a:xfrm>
-            <a:off x="656085" y="3502423"/>
-            <a:ext cx="4029521" cy="1716483"/>
+            <a:off x="656085" y="7203316"/>
+            <a:ext cx="4029521" cy="3530234"/>
           </a:xfrm>
         </p:spPr>
         <p:txBody>
@@ -1417,8 +1423,8 @@
         </p:nvSpPr>
         <p:spPr>
           <a:xfrm>
-            <a:off x="656085" y="5218906"/>
-            <a:ext cx="4029521" cy="7676225"/>
+            <a:off x="656085" y="10733551"/>
+            <a:ext cx="4029521" cy="15787436"/>
           </a:xfrm>
         </p:spPr>
         <p:txBody>
@@ -1474,8 +1480,8 @@
         </p:nvSpPr>
         <p:spPr>
           <a:xfrm>
-            <a:off x="4822032" y="3502423"/>
-            <a:ext cx="4049366" cy="1716483"/>
+            <a:off x="4822032" y="7203316"/>
+            <a:ext cx="4049366" cy="3530234"/>
           </a:xfrm>
         </p:spPr>
         <p:txBody>
@@ -1539,8 +1545,8 @@
         </p:nvSpPr>
         <p:spPr>
           <a:xfrm>
-            <a:off x="4822032" y="5218906"/>
-            <a:ext cx="4049366" cy="7676225"/>
+            <a:off x="4822032" y="10733551"/>
+            <a:ext cx="4049366" cy="15787436"/>
           </a:xfrm>
         </p:spPr>
         <p:txBody>
@@ -1601,7 +1607,7 @@
           <a:p>
             <a:fld id="{2AE88528-DDCC-4DB1-844C-DD3FEDD6CA17}" type="datetimeFigureOut">
               <a:rPr lang="pl-PL" smtClean="0"/>
-              <a:t>2024-01-29</a:t>
+              <a:t>2024-02-04</a:t>
             </a:fld>
             <a:endParaRPr lang="pl-PL"/>
           </a:p>
@@ -1652,7 +1658,7 @@
     </p:spTree>
     <p:extLst>
       <p:ext uri="{BB962C8B-B14F-4D97-AF65-F5344CB8AC3E}">
-        <p14:creationId xmlns:p14="http://schemas.microsoft.com/office/powerpoint/2010/main" val="3331585460"/>
+        <p14:creationId xmlns:p14="http://schemas.microsoft.com/office/powerpoint/2010/main" val="476110028"/>
       </p:ext>
     </p:extLst>
   </p:cSld>
@@ -1719,7 +1725,7 @@
           <a:p>
             <a:fld id="{2AE88528-DDCC-4DB1-844C-DD3FEDD6CA17}" type="datetimeFigureOut">
               <a:rPr lang="pl-PL" smtClean="0"/>
-              <a:t>2024-01-29</a:t>
+              <a:t>2024-02-04</a:t>
             </a:fld>
             <a:endParaRPr lang="pl-PL"/>
           </a:p>
@@ -1770,7 +1776,7 @@
     </p:spTree>
     <p:extLst>
       <p:ext uri="{BB962C8B-B14F-4D97-AF65-F5344CB8AC3E}">
-        <p14:creationId xmlns:p14="http://schemas.microsoft.com/office/powerpoint/2010/main" val="4098936077"/>
+        <p14:creationId xmlns:p14="http://schemas.microsoft.com/office/powerpoint/2010/main" val="2812603624"/>
       </p:ext>
     </p:extLst>
   </p:cSld>
@@ -1814,7 +1820,7 @@
           <a:p>
             <a:fld id="{2AE88528-DDCC-4DB1-844C-DD3FEDD6CA17}" type="datetimeFigureOut">
               <a:rPr lang="pl-PL" smtClean="0"/>
-              <a:t>2024-01-29</a:t>
+              <a:t>2024-02-04</a:t>
             </a:fld>
             <a:endParaRPr lang="pl-PL"/>
           </a:p>
@@ -1865,7 +1871,7 @@
     </p:spTree>
     <p:extLst>
       <p:ext uri="{BB962C8B-B14F-4D97-AF65-F5344CB8AC3E}">
-        <p14:creationId xmlns:p14="http://schemas.microsoft.com/office/powerpoint/2010/main" val="2733466068"/>
+        <p14:creationId xmlns:p14="http://schemas.microsoft.com/office/powerpoint/2010/main" val="3493057528"/>
       </p:ext>
     </p:extLst>
   </p:cSld>
@@ -1904,8 +1910,8 @@
         </p:nvSpPr>
         <p:spPr>
           <a:xfrm>
-            <a:off x="656085" y="952500"/>
-            <a:ext cx="3072060" cy="3333750"/>
+            <a:off x="656085" y="1958975"/>
+            <a:ext cx="3072060" cy="6856413"/>
           </a:xfrm>
         </p:spPr>
         <p:txBody>
@@ -1936,8 +1942,8 @@
         </p:nvSpPr>
         <p:spPr>
           <a:xfrm>
-            <a:off x="4049366" y="2057139"/>
-            <a:ext cx="4822031" cy="10153385"/>
+            <a:off x="4049366" y="4230848"/>
+            <a:ext cx="4822031" cy="20882129"/>
           </a:xfrm>
         </p:spPr>
         <p:txBody>
@@ -2021,8 +2027,8 @@
         </p:nvSpPr>
         <p:spPr>
           <a:xfrm>
-            <a:off x="656085" y="4286250"/>
-            <a:ext cx="3072060" cy="7940808"/>
+            <a:off x="656085" y="8815387"/>
+            <a:ext cx="3072060" cy="16331596"/>
           </a:xfrm>
         </p:spPr>
         <p:txBody>
@@ -2091,7 +2097,7 @@
           <a:p>
             <a:fld id="{2AE88528-DDCC-4DB1-844C-DD3FEDD6CA17}" type="datetimeFigureOut">
               <a:rPr lang="pl-PL" smtClean="0"/>
-              <a:t>2024-01-29</a:t>
+              <a:t>2024-02-04</a:t>
             </a:fld>
             <a:endParaRPr lang="pl-PL"/>
           </a:p>
@@ -2142,7 +2148,7 @@
     </p:spTree>
     <p:extLst>
       <p:ext uri="{BB962C8B-B14F-4D97-AF65-F5344CB8AC3E}">
-        <p14:creationId xmlns:p14="http://schemas.microsoft.com/office/powerpoint/2010/main" val="2828187657"/>
+        <p14:creationId xmlns:p14="http://schemas.microsoft.com/office/powerpoint/2010/main" val="297363281"/>
       </p:ext>
     </p:extLst>
   </p:cSld>
@@ -2181,8 +2187,8 @@
         </p:nvSpPr>
         <p:spPr>
           <a:xfrm>
-            <a:off x="656085" y="952500"/>
-            <a:ext cx="3072060" cy="3333750"/>
+            <a:off x="656085" y="1958975"/>
+            <a:ext cx="3072060" cy="6856413"/>
           </a:xfrm>
         </p:spPr>
         <p:txBody>
@@ -2213,8 +2219,8 @@
         </p:nvSpPr>
         <p:spPr>
           <a:xfrm>
-            <a:off x="4049366" y="2057139"/>
-            <a:ext cx="4822031" cy="10153385"/>
+            <a:off x="4049366" y="4230848"/>
+            <a:ext cx="4822031" cy="20882129"/>
           </a:xfrm>
         </p:spPr>
         <p:txBody>
@@ -2278,8 +2284,8 @@
         </p:nvSpPr>
         <p:spPr>
           <a:xfrm>
-            <a:off x="656085" y="4286250"/>
-            <a:ext cx="3072060" cy="7940808"/>
+            <a:off x="656085" y="8815387"/>
+            <a:ext cx="3072060" cy="16331596"/>
           </a:xfrm>
         </p:spPr>
         <p:txBody>
@@ -2348,7 +2354,7 @@
           <a:p>
             <a:fld id="{2AE88528-DDCC-4DB1-844C-DD3FEDD6CA17}" type="datetimeFigureOut">
               <a:rPr lang="pl-PL" smtClean="0"/>
-              <a:t>2024-01-29</a:t>
+              <a:t>2024-02-04</a:t>
             </a:fld>
             <a:endParaRPr lang="pl-PL"/>
           </a:p>
@@ -2399,7 +2405,7 @@
     </p:spTree>
     <p:extLst>
       <p:ext uri="{BB962C8B-B14F-4D97-AF65-F5344CB8AC3E}">
-        <p14:creationId xmlns:p14="http://schemas.microsoft.com/office/powerpoint/2010/main" val="2777314783"/>
+        <p14:creationId xmlns:p14="http://schemas.microsoft.com/office/powerpoint/2010/main" val="2132057862"/>
       </p:ext>
     </p:extLst>
   </p:cSld>
@@ -2443,8 +2449,8 @@
         </p:nvSpPr>
         <p:spPr>
           <a:xfrm>
-            <a:off x="654844" y="760680"/>
-            <a:ext cx="8215313" cy="2761590"/>
+            <a:off x="654844" y="1564466"/>
+            <a:ext cx="8215313" cy="5679669"/>
           </a:xfrm>
           <a:prstGeom prst="rect">
             <a:avLst/>
@@ -2476,8 +2482,8 @@
         </p:nvSpPr>
         <p:spPr>
           <a:xfrm>
-            <a:off x="654844" y="3803385"/>
-            <a:ext cx="8215313" cy="9065288"/>
+            <a:off x="654844" y="7822296"/>
+            <a:ext cx="8215313" cy="18644275"/>
           </a:xfrm>
           <a:prstGeom prst="rect">
             <a:avLst/>
@@ -2538,8 +2544,8 @@
         </p:nvSpPr>
         <p:spPr>
           <a:xfrm>
-            <a:off x="654844" y="13242399"/>
-            <a:ext cx="2143125" cy="760677"/>
+            <a:off x="654844" y="27235201"/>
+            <a:ext cx="2143125" cy="1564459"/>
           </a:xfrm>
           <a:prstGeom prst="rect">
             <a:avLst/>
@@ -2561,7 +2567,7 @@
           <a:p>
             <a:fld id="{2AE88528-DDCC-4DB1-844C-DD3FEDD6CA17}" type="datetimeFigureOut">
               <a:rPr lang="pl-PL" smtClean="0"/>
-              <a:t>2024-01-29</a:t>
+              <a:t>2024-02-04</a:t>
             </a:fld>
             <a:endParaRPr lang="pl-PL"/>
           </a:p>
@@ -2579,8 +2585,8 @@
         </p:nvSpPr>
         <p:spPr>
           <a:xfrm>
-            <a:off x="3155156" y="13242399"/>
-            <a:ext cx="3214688" cy="760677"/>
+            <a:off x="3155156" y="27235201"/>
+            <a:ext cx="3214688" cy="1564459"/>
           </a:xfrm>
           <a:prstGeom prst="rect">
             <a:avLst/>
@@ -2616,8 +2622,8 @@
         </p:nvSpPr>
         <p:spPr>
           <a:xfrm>
-            <a:off x="6727031" y="13242399"/>
-            <a:ext cx="2143125" cy="760677"/>
+            <a:off x="6727031" y="27235201"/>
+            <a:ext cx="2143125" cy="1564459"/>
           </a:xfrm>
           <a:prstGeom prst="rect">
             <a:avLst/>
@@ -2648,23 +2654,23 @@
     </p:spTree>
     <p:extLst>
       <p:ext uri="{BB962C8B-B14F-4D97-AF65-F5344CB8AC3E}">
-        <p14:creationId xmlns:p14="http://schemas.microsoft.com/office/powerpoint/2010/main" val="3006596330"/>
+        <p14:creationId xmlns:p14="http://schemas.microsoft.com/office/powerpoint/2010/main" val="3154831812"/>
       </p:ext>
     </p:extLst>
   </p:cSld>
   <p:clrMap bg1="lt1" tx1="dk1" bg2="lt2" tx2="dk2" accent1="accent1" accent2="accent2" accent3="accent3" accent4="accent4" accent5="accent5" accent6="accent6" hlink="hlink" folHlink="folHlink"/>
   <p:sldLayoutIdLst>
-    <p:sldLayoutId id="2147483661" r:id="rId1"/>
-    <p:sldLayoutId id="2147483662" r:id="rId2"/>
-    <p:sldLayoutId id="2147483663" r:id="rId3"/>
-    <p:sldLayoutId id="2147483664" r:id="rId4"/>
-    <p:sldLayoutId id="2147483665" r:id="rId5"/>
-    <p:sldLayoutId id="2147483666" r:id="rId6"/>
-    <p:sldLayoutId id="2147483667" r:id="rId7"/>
-    <p:sldLayoutId id="2147483668" r:id="rId8"/>
-    <p:sldLayoutId id="2147483669" r:id="rId9"/>
-    <p:sldLayoutId id="2147483670" r:id="rId10"/>
-    <p:sldLayoutId id="2147483671" r:id="rId11"/>
+    <p:sldLayoutId id="2147483673" r:id="rId1"/>
+    <p:sldLayoutId id="2147483674" r:id="rId2"/>
+    <p:sldLayoutId id="2147483675" r:id="rId3"/>
+    <p:sldLayoutId id="2147483676" r:id="rId4"/>
+    <p:sldLayoutId id="2147483677" r:id="rId5"/>
+    <p:sldLayoutId id="2147483678" r:id="rId6"/>
+    <p:sldLayoutId id="2147483679" r:id="rId7"/>
+    <p:sldLayoutId id="2147483680" r:id="rId8"/>
+    <p:sldLayoutId id="2147483681" r:id="rId9"/>
+    <p:sldLayoutId id="2147483682" r:id="rId10"/>
+    <p:sldLayoutId id="2147483683" r:id="rId11"/>
   </p:sldLayoutIdLst>
   <p:txStyles>
     <p:titleStyle>
@@ -2954,6 +2960,1263 @@
   <p:cSld>
     <p:bg>
       <p:bgPr>
+        <a:gradFill>
+          <a:gsLst>
+            <a:gs pos="43000">
+              <a:srgbClr val="870EA0">
+                <a:lumMod val="93000"/>
+                <a:lumOff val="7000"/>
+              </a:srgbClr>
+            </a:gs>
+            <a:gs pos="9000">
+              <a:srgbClr val="300539">
+                <a:lumMod val="75000"/>
+                <a:lumOff val="25000"/>
+              </a:srgbClr>
+            </a:gs>
+            <a:gs pos="90000">
+              <a:srgbClr val="200326">
+                <a:lumMod val="90000"/>
+                <a:lumOff val="10000"/>
+              </a:srgbClr>
+            </a:gs>
+          </a:gsLst>
+          <a:path path="circle">
+            <a:fillToRect t="100000" r="100000"/>
+          </a:path>
+        </a:gradFill>
+        <a:effectLst/>
+      </p:bgPr>
+    </p:bg>
+    <p:spTree>
+      <p:nvGrpSpPr>
+        <p:cNvPr id="1" name=""/>
+        <p:cNvGrpSpPr/>
+        <p:nvPr/>
+      </p:nvGrpSpPr>
+      <p:grpSpPr>
+        <a:xfrm>
+          <a:off x="0" y="0"/>
+          <a:ext cx="0" cy="0"/>
+          <a:chOff x="0" y="0"/>
+          <a:chExt cx="0" cy="0"/>
+        </a:xfrm>
+      </p:grpSpPr>
+      <p:grpSp>
+        <p:nvGrpSpPr>
+          <p:cNvPr id="33" name="Footer">
+            <a:extLst>
+              <a:ext uri="{FF2B5EF4-FFF2-40B4-BE49-F238E27FC236}">
+                <a16:creationId xmlns:a16="http://schemas.microsoft.com/office/drawing/2014/main" id="{291DC8C4-DC8B-66F8-CB75-AF65561B373B}"/>
+              </a:ext>
+            </a:extLst>
+          </p:cNvPr>
+          <p:cNvGrpSpPr/>
+          <p:nvPr/>
+        </p:nvGrpSpPr>
+        <p:grpSpPr>
+          <a:xfrm>
+            <a:off x="1" y="29001241"/>
+            <a:ext cx="9525000" cy="381000"/>
+            <a:chOff x="1" y="29001241"/>
+            <a:chExt cx="9525000" cy="381000"/>
+          </a:xfrm>
+        </p:grpSpPr>
+        <p:sp>
+          <p:nvSpPr>
+            <p:cNvPr id="23" name="Footer BG">
+              <a:extLst>
+                <a:ext uri="{FF2B5EF4-FFF2-40B4-BE49-F238E27FC236}">
+                  <a16:creationId xmlns:a16="http://schemas.microsoft.com/office/drawing/2014/main" id="{67150049-20EF-661A-76FC-4DD536216C16}"/>
+                </a:ext>
+              </a:extLst>
+            </p:cNvPr>
+            <p:cNvSpPr/>
+            <p:nvPr/>
+          </p:nvSpPr>
+          <p:spPr>
+            <a:xfrm>
+              <a:off x="1" y="29001241"/>
+              <a:ext cx="9525000" cy="381000"/>
+            </a:xfrm>
+            <a:prstGeom prst="rect">
+              <a:avLst/>
+            </a:prstGeom>
+            <a:solidFill>
+              <a:srgbClr val="0A0A0A"/>
+            </a:solidFill>
+            <a:ln>
+              <a:noFill/>
+            </a:ln>
+          </p:spPr>
+          <p:style>
+            <a:lnRef idx="2">
+              <a:schemeClr val="accent1">
+                <a:shade val="15000"/>
+              </a:schemeClr>
+            </a:lnRef>
+            <a:fillRef idx="1">
+              <a:schemeClr val="accent1"/>
+            </a:fillRef>
+            <a:effectRef idx="0">
+              <a:schemeClr val="accent1"/>
+            </a:effectRef>
+            <a:fontRef idx="minor">
+              <a:schemeClr val="lt1"/>
+            </a:fontRef>
+          </p:style>
+          <p:txBody>
+            <a:bodyPr rtlCol="0" anchor="ctr"/>
+            <a:lstStyle/>
+            <a:p>
+              <a:pPr algn="ctr"/>
+              <a:endParaRPr lang="pl-PL"/>
+            </a:p>
+          </p:txBody>
+        </p:sp>
+        <p:sp>
+          <p:nvSpPr>
+            <p:cNvPr id="30" name="Footer text">
+              <a:extLst>
+                <a:ext uri="{FF2B5EF4-FFF2-40B4-BE49-F238E27FC236}">
+                  <a16:creationId xmlns:a16="http://schemas.microsoft.com/office/drawing/2014/main" id="{B9A539E9-87F6-27AA-C790-709BCB98EC12}"/>
+                </a:ext>
+              </a:extLst>
+            </p:cNvPr>
+            <p:cNvSpPr/>
+            <p:nvPr/>
+          </p:nvSpPr>
+          <p:spPr>
+            <a:xfrm>
+              <a:off x="476250" y="29094106"/>
+              <a:ext cx="8572500" cy="190500"/>
+            </a:xfrm>
+            <a:prstGeom prst="rect">
+              <a:avLst/>
+            </a:prstGeom>
+            <a:solidFill>
+              <a:srgbClr val="0A0A0A"/>
+            </a:solidFill>
+            <a:ln>
+              <a:noFill/>
+            </a:ln>
+          </p:spPr>
+          <p:style>
+            <a:lnRef idx="2">
+              <a:schemeClr val="accent1">
+                <a:shade val="15000"/>
+              </a:schemeClr>
+            </a:lnRef>
+            <a:fillRef idx="1">
+              <a:schemeClr val="accent1"/>
+            </a:fillRef>
+            <a:effectRef idx="0">
+              <a:schemeClr val="accent1"/>
+            </a:effectRef>
+            <a:fontRef idx="minor">
+              <a:schemeClr val="lt1"/>
+            </a:fontRef>
+          </p:style>
+          <p:txBody>
+            <a:bodyPr rtlCol="0" anchor="ctr"/>
+            <a:lstStyle/>
+            <a:p>
+              <a:r>
+                <a:rPr lang="pl-PL" sz="900" dirty="0" err="1">
+                  <a:latin typeface="Segoe UI" panose="020B0502040204020203" pitchFamily="34" charset="0"/>
+                  <a:cs typeface="Segoe UI" panose="020B0502040204020203" pitchFamily="34" charset="0"/>
+                </a:rPr>
+                <a:t>Created</a:t>
+              </a:r>
+              <a:r>
+                <a:rPr lang="pl-PL" sz="900" dirty="0">
+                  <a:latin typeface="Segoe UI" panose="020B0502040204020203" pitchFamily="34" charset="0"/>
+                  <a:cs typeface="Segoe UI" panose="020B0502040204020203" pitchFamily="34" charset="0"/>
+                </a:rPr>
+                <a:t> by – Mateusz Koniuch</a:t>
+              </a:r>
+            </a:p>
+          </p:txBody>
+        </p:sp>
+        <p:pic>
+          <p:nvPicPr>
+            <p:cNvPr id="21" name="Logo kon-mat" descr="A white letter on a black background&#10;&#10;Description automatically generated">
+              <a:extLst>
+                <a:ext uri="{FF2B5EF4-FFF2-40B4-BE49-F238E27FC236}">
+                  <a16:creationId xmlns:a16="http://schemas.microsoft.com/office/drawing/2014/main" id="{54A0EBF5-24BC-CF45-74CE-EE91A1BDD0D1}"/>
+                </a:ext>
+              </a:extLst>
+            </p:cNvPr>
+            <p:cNvPicPr>
+              <a:picLocks noChangeAspect="1"/>
+            </p:cNvPicPr>
+            <p:nvPr/>
+          </p:nvPicPr>
+          <p:blipFill>
+            <a:blip r:embed="rId2">
+              <a:extLst>
+                <a:ext uri="{28A0092B-C50C-407E-A947-70E740481C1C}">
+                  <a14:useLocalDpi xmlns:a14="http://schemas.microsoft.com/office/drawing/2010/main" val="0"/>
+                </a:ext>
+              </a:extLst>
+            </a:blip>
+            <a:stretch>
+              <a:fillRect/>
+            </a:stretch>
+          </p:blipFill>
+          <p:spPr>
+            <a:xfrm>
+              <a:off x="2149276" y="29113156"/>
+              <a:ext cx="153685" cy="152400"/>
+            </a:xfrm>
+            <a:prstGeom prst="rect">
+              <a:avLst/>
+            </a:prstGeom>
+          </p:spPr>
+        </p:pic>
+        <p:pic>
+          <p:nvPicPr>
+            <p:cNvPr id="27" name="Logo LinkedIn" descr="A blue square with white letters&#10;&#10;Description automatically generated">
+              <a:extLst>
+                <a:ext uri="{FF2B5EF4-FFF2-40B4-BE49-F238E27FC236}">
+                  <a16:creationId xmlns:a16="http://schemas.microsoft.com/office/drawing/2014/main" id="{494D8F7E-3A35-C427-19B1-2116C13EC32D}"/>
+                </a:ext>
+              </a:extLst>
+            </p:cNvPr>
+            <p:cNvPicPr>
+              <a:picLocks noChangeAspect="1"/>
+            </p:cNvPicPr>
+            <p:nvPr/>
+          </p:nvPicPr>
+          <p:blipFill>
+            <a:blip r:embed="rId3">
+              <a:extLst>
+                <a:ext uri="{28A0092B-C50C-407E-A947-70E740481C1C}">
+                  <a14:useLocalDpi xmlns:a14="http://schemas.microsoft.com/office/drawing/2010/main" val="0"/>
+                </a:ext>
+              </a:extLst>
+            </a:blip>
+            <a:stretch>
+              <a:fillRect/>
+            </a:stretch>
+          </p:blipFill>
+          <p:spPr>
+            <a:xfrm>
+              <a:off x="8765381" y="29094106"/>
+              <a:ext cx="190500" cy="190500"/>
+            </a:xfrm>
+            <a:prstGeom prst="rect">
+              <a:avLst/>
+            </a:prstGeom>
+          </p:spPr>
+        </p:pic>
+        <p:pic>
+          <p:nvPicPr>
+            <p:cNvPr id="25" name="Logo GitHub" descr="A black cat with a blue circle&#10;&#10;Description automatically generated">
+              <a:extLst>
+                <a:ext uri="{FF2B5EF4-FFF2-40B4-BE49-F238E27FC236}">
+                  <a16:creationId xmlns:a16="http://schemas.microsoft.com/office/drawing/2014/main" id="{30E31A2D-77B3-C687-8626-6051F68FAD90}"/>
+                </a:ext>
+              </a:extLst>
+            </p:cNvPr>
+            <p:cNvPicPr>
+              <a:picLocks noChangeAspect="1"/>
+            </p:cNvPicPr>
+            <p:nvPr/>
+          </p:nvPicPr>
+          <p:blipFill>
+            <a:blip r:embed="rId4">
+              <a:extLst>
+                <a:ext uri="{28A0092B-C50C-407E-A947-70E740481C1C}">
+                  <a14:useLocalDpi xmlns:a14="http://schemas.microsoft.com/office/drawing/2010/main" val="0"/>
+                </a:ext>
+              </a:extLst>
+            </a:blip>
+            <a:stretch>
+              <a:fillRect/>
+            </a:stretch>
+          </p:blipFill>
+          <p:spPr>
+            <a:xfrm>
+              <a:off x="8422610" y="29094106"/>
+              <a:ext cx="190500" cy="190500"/>
+            </a:xfrm>
+            <a:prstGeom prst="rect">
+              <a:avLst/>
+            </a:prstGeom>
+          </p:spPr>
+        </p:pic>
+        <p:pic>
+          <p:nvPicPr>
+            <p:cNvPr id="29" name="Logo Novy Pro" descr="A colorful logo with black background&#10;&#10;Description automatically generated">
+              <a:extLst>
+                <a:ext uri="{FF2B5EF4-FFF2-40B4-BE49-F238E27FC236}">
+                  <a16:creationId xmlns:a16="http://schemas.microsoft.com/office/drawing/2014/main" id="{E9CB325F-3F8B-26D2-69F3-656AB90DCF8A}"/>
+                </a:ext>
+              </a:extLst>
+            </p:cNvPr>
+            <p:cNvPicPr>
+              <a:picLocks noChangeAspect="1"/>
+            </p:cNvPicPr>
+            <p:nvPr/>
+          </p:nvPicPr>
+          <p:blipFill>
+            <a:blip r:embed="rId5">
+              <a:extLst>
+                <a:ext uri="{28A0092B-C50C-407E-A947-70E740481C1C}">
+                  <a14:useLocalDpi xmlns:a14="http://schemas.microsoft.com/office/drawing/2010/main" val="0"/>
+                </a:ext>
+              </a:extLst>
+            </a:blip>
+            <a:stretch>
+              <a:fillRect/>
+            </a:stretch>
+          </p:blipFill>
+          <p:spPr>
+            <a:xfrm>
+              <a:off x="8049203" y="29094106"/>
+              <a:ext cx="221136" cy="190500"/>
+            </a:xfrm>
+            <a:prstGeom prst="rect">
+              <a:avLst/>
+            </a:prstGeom>
+          </p:spPr>
+        </p:pic>
+      </p:grpSp>
+      <p:sp>
+        <p:nvSpPr>
+          <p:cNvPr id="15" name="Bar - EbA BG">
+            <a:extLst>
+              <a:ext uri="{FF2B5EF4-FFF2-40B4-BE49-F238E27FC236}">
+                <a16:creationId xmlns:a16="http://schemas.microsoft.com/office/drawing/2014/main" id="{012D96D1-4AFB-93D5-C45D-E4E7E589355D}"/>
+              </a:ext>
+            </a:extLst>
+          </p:cNvPr>
+          <p:cNvSpPr/>
+          <p:nvPr/>
+        </p:nvSpPr>
+        <p:spPr>
+          <a:xfrm>
+            <a:off x="4918070" y="23630729"/>
+            <a:ext cx="4333875" cy="2095500"/>
+          </a:xfrm>
+          <a:prstGeom prst="roundRect">
+            <a:avLst>
+              <a:gd name="adj" fmla="val 8406"/>
+            </a:avLst>
+          </a:prstGeom>
+          <a:solidFill>
+            <a:srgbClr val="0A0A0A"/>
+          </a:solidFill>
+          <a:ln>
+            <a:noFill/>
+          </a:ln>
+          <a:effectLst>
+            <a:outerShdw blurRad="38100" dist="25400" dir="13500000" algn="br" rotWithShape="0">
+              <a:srgbClr val="FFFFFA">
+                <a:alpha val="30000"/>
+              </a:srgbClr>
+            </a:outerShdw>
+            <a:softEdge rad="0"/>
+          </a:effectLst>
+        </p:spPr>
+        <p:style>
+          <a:lnRef idx="2">
+            <a:schemeClr val="accent1">
+              <a:shade val="15000"/>
+            </a:schemeClr>
+          </a:lnRef>
+          <a:fillRef idx="1">
+            <a:schemeClr val="accent1"/>
+          </a:fillRef>
+          <a:effectRef idx="0">
+            <a:schemeClr val="accent1"/>
+          </a:effectRef>
+          <a:fontRef idx="minor">
+            <a:schemeClr val="lt1"/>
+          </a:fontRef>
+        </p:style>
+        <p:txBody>
+          <a:bodyPr rtlCol="0" anchor="ctr"/>
+          <a:lstStyle/>
+          <a:p>
+            <a:pPr algn="ctr"/>
+            <a:endParaRPr lang="pl-PL"/>
+          </a:p>
+        </p:txBody>
+      </p:sp>
+      <p:sp>
+        <p:nvSpPr>
+          <p:cNvPr id="16" name="Bar - EbG BG">
+            <a:extLst>
+              <a:ext uri="{FF2B5EF4-FFF2-40B4-BE49-F238E27FC236}">
+                <a16:creationId xmlns:a16="http://schemas.microsoft.com/office/drawing/2014/main" id="{0D41AB6C-7D1A-0763-41E1-714DAD77113C}"/>
+              </a:ext>
+            </a:extLst>
+          </p:cNvPr>
+          <p:cNvSpPr/>
+          <p:nvPr/>
+        </p:nvSpPr>
+        <p:spPr>
+          <a:xfrm>
+            <a:off x="4918069" y="25869104"/>
+            <a:ext cx="4333875" cy="2857500"/>
+          </a:xfrm>
+          <a:prstGeom prst="roundRect">
+            <a:avLst>
+              <a:gd name="adj" fmla="val 8406"/>
+            </a:avLst>
+          </a:prstGeom>
+          <a:solidFill>
+            <a:srgbClr val="0A0A0A"/>
+          </a:solidFill>
+          <a:ln>
+            <a:noFill/>
+          </a:ln>
+          <a:effectLst>
+            <a:outerShdw blurRad="38100" dist="25400" dir="13500000" algn="br" rotWithShape="0">
+              <a:srgbClr val="FFFFFA">
+                <a:alpha val="30000"/>
+              </a:srgbClr>
+            </a:outerShdw>
+            <a:softEdge rad="0"/>
+          </a:effectLst>
+        </p:spPr>
+        <p:style>
+          <a:lnRef idx="2">
+            <a:schemeClr val="accent1">
+              <a:shade val="15000"/>
+            </a:schemeClr>
+          </a:lnRef>
+          <a:fillRef idx="1">
+            <a:schemeClr val="accent1"/>
+          </a:fillRef>
+          <a:effectRef idx="0">
+            <a:schemeClr val="accent1"/>
+          </a:effectRef>
+          <a:fontRef idx="minor">
+            <a:schemeClr val="lt1"/>
+          </a:fontRef>
+        </p:style>
+        <p:txBody>
+          <a:bodyPr rtlCol="0" anchor="ctr"/>
+          <a:lstStyle/>
+          <a:p>
+            <a:pPr algn="ctr"/>
+            <a:endParaRPr lang="pl-PL"/>
+          </a:p>
+        </p:txBody>
+      </p:sp>
+      <p:sp>
+        <p:nvSpPr>
+          <p:cNvPr id="13" name="Bar - EbGA BG">
+            <a:extLst>
+              <a:ext uri="{FF2B5EF4-FFF2-40B4-BE49-F238E27FC236}">
+                <a16:creationId xmlns:a16="http://schemas.microsoft.com/office/drawing/2014/main" id="{5F6ADBF3-2509-C1F9-7DCC-5F40E903A1FE}"/>
+              </a:ext>
+            </a:extLst>
+          </p:cNvPr>
+          <p:cNvSpPr/>
+          <p:nvPr/>
+        </p:nvSpPr>
+        <p:spPr>
+          <a:xfrm>
+            <a:off x="292097" y="23630729"/>
+            <a:ext cx="4333875" cy="5095875"/>
+          </a:xfrm>
+          <a:prstGeom prst="roundRect">
+            <a:avLst>
+              <a:gd name="adj" fmla="val 8406"/>
+            </a:avLst>
+          </a:prstGeom>
+          <a:solidFill>
+            <a:srgbClr val="0A0A0A"/>
+          </a:solidFill>
+          <a:ln>
+            <a:noFill/>
+          </a:ln>
+          <a:effectLst>
+            <a:outerShdw blurRad="38100" dist="25400" dir="13500000" algn="br" rotWithShape="0">
+              <a:srgbClr val="FFFFFA">
+                <a:alpha val="30000"/>
+              </a:srgbClr>
+            </a:outerShdw>
+            <a:softEdge rad="0"/>
+          </a:effectLst>
+        </p:spPr>
+        <p:style>
+          <a:lnRef idx="2">
+            <a:schemeClr val="accent1">
+              <a:shade val="15000"/>
+            </a:schemeClr>
+          </a:lnRef>
+          <a:fillRef idx="1">
+            <a:schemeClr val="accent1"/>
+          </a:fillRef>
+          <a:effectRef idx="0">
+            <a:schemeClr val="accent1"/>
+          </a:effectRef>
+          <a:fontRef idx="minor">
+            <a:schemeClr val="lt1"/>
+          </a:fontRef>
+        </p:style>
+        <p:txBody>
+          <a:bodyPr rtlCol="0" anchor="ctr"/>
+          <a:lstStyle/>
+          <a:p>
+            <a:pPr algn="ctr"/>
+            <a:endParaRPr lang="pl-PL"/>
+          </a:p>
+        </p:txBody>
+      </p:sp>
+      <p:sp>
+        <p:nvSpPr>
+          <p:cNvPr id="12" name="Box Plot - EbG BG">
+            <a:extLst>
+              <a:ext uri="{FF2B5EF4-FFF2-40B4-BE49-F238E27FC236}">
+                <a16:creationId xmlns:a16="http://schemas.microsoft.com/office/drawing/2014/main" id="{894164E8-281D-DDCA-BCAE-21DEF5A4484A}"/>
+              </a:ext>
+            </a:extLst>
+          </p:cNvPr>
+          <p:cNvSpPr/>
+          <p:nvPr/>
+        </p:nvSpPr>
+        <p:spPr>
+          <a:xfrm>
+            <a:off x="4918070" y="19324636"/>
+            <a:ext cx="4333875" cy="4000500"/>
+          </a:xfrm>
+          <a:prstGeom prst="roundRect">
+            <a:avLst>
+              <a:gd name="adj" fmla="val 8406"/>
+            </a:avLst>
+          </a:prstGeom>
+          <a:solidFill>
+            <a:srgbClr val="0A0A0A"/>
+          </a:solidFill>
+          <a:ln>
+            <a:noFill/>
+          </a:ln>
+          <a:effectLst>
+            <a:outerShdw blurRad="38100" dist="25400" dir="13500000" algn="br" rotWithShape="0">
+              <a:srgbClr val="FFFFFA">
+                <a:alpha val="30000"/>
+              </a:srgbClr>
+            </a:outerShdw>
+            <a:softEdge rad="0"/>
+          </a:effectLst>
+        </p:spPr>
+        <p:style>
+          <a:lnRef idx="2">
+            <a:schemeClr val="accent1">
+              <a:shade val="15000"/>
+            </a:schemeClr>
+          </a:lnRef>
+          <a:fillRef idx="1">
+            <a:schemeClr val="accent1"/>
+          </a:fillRef>
+          <a:effectRef idx="0">
+            <a:schemeClr val="accent1"/>
+          </a:effectRef>
+          <a:fontRef idx="minor">
+            <a:schemeClr val="lt1"/>
+          </a:fontRef>
+        </p:style>
+        <p:txBody>
+          <a:bodyPr rtlCol="0" anchor="ctr"/>
+          <a:lstStyle/>
+          <a:p>
+            <a:pPr algn="ctr"/>
+            <a:endParaRPr lang="pl-PL"/>
+          </a:p>
+        </p:txBody>
+      </p:sp>
+      <p:sp>
+        <p:nvSpPr>
+          <p:cNvPr id="11" name="Box Plot - EbA BG">
+            <a:extLst>
+              <a:ext uri="{FF2B5EF4-FFF2-40B4-BE49-F238E27FC236}">
+                <a16:creationId xmlns:a16="http://schemas.microsoft.com/office/drawing/2014/main" id="{41F2848E-E14B-E380-4244-DC1FB2CB9E01}"/>
+              </a:ext>
+            </a:extLst>
+          </p:cNvPr>
+          <p:cNvSpPr/>
+          <p:nvPr/>
+        </p:nvSpPr>
+        <p:spPr>
+          <a:xfrm>
+            <a:off x="292098" y="19324636"/>
+            <a:ext cx="4333875" cy="4000500"/>
+          </a:xfrm>
+          <a:prstGeom prst="roundRect">
+            <a:avLst>
+              <a:gd name="adj" fmla="val 8406"/>
+            </a:avLst>
+          </a:prstGeom>
+          <a:solidFill>
+            <a:srgbClr val="0A0A0A"/>
+          </a:solidFill>
+          <a:ln>
+            <a:noFill/>
+          </a:ln>
+          <a:effectLst>
+            <a:outerShdw blurRad="38100" dist="25400" dir="13500000" algn="br" rotWithShape="0">
+              <a:srgbClr val="FFFFFA">
+                <a:alpha val="30000"/>
+              </a:srgbClr>
+            </a:outerShdw>
+            <a:softEdge rad="0"/>
+          </a:effectLst>
+        </p:spPr>
+        <p:style>
+          <a:lnRef idx="2">
+            <a:schemeClr val="accent1">
+              <a:shade val="15000"/>
+            </a:schemeClr>
+          </a:lnRef>
+          <a:fillRef idx="1">
+            <a:schemeClr val="accent1"/>
+          </a:fillRef>
+          <a:effectRef idx="0">
+            <a:schemeClr val="accent1"/>
+          </a:effectRef>
+          <a:fontRef idx="minor">
+            <a:schemeClr val="lt1"/>
+          </a:fontRef>
+        </p:style>
+        <p:txBody>
+          <a:bodyPr rtlCol="0" anchor="ctr"/>
+          <a:lstStyle/>
+          <a:p>
+            <a:pPr algn="ctr"/>
+            <a:endParaRPr lang="pl-PL"/>
+          </a:p>
+        </p:txBody>
+      </p:sp>
+      <p:sp>
+        <p:nvSpPr>
+          <p:cNvPr id="10" name="Bar - EbCA BG">
+            <a:extLst>
+              <a:ext uri="{FF2B5EF4-FFF2-40B4-BE49-F238E27FC236}">
+                <a16:creationId xmlns:a16="http://schemas.microsoft.com/office/drawing/2014/main" id="{0E81DB5D-39B3-5698-1FF1-62E82575BEF1}"/>
+              </a:ext>
+            </a:extLst>
+          </p:cNvPr>
+          <p:cNvSpPr/>
+          <p:nvPr/>
+        </p:nvSpPr>
+        <p:spPr>
+          <a:xfrm>
+            <a:off x="292100" y="15049499"/>
+            <a:ext cx="8953500" cy="4000500"/>
+          </a:xfrm>
+          <a:prstGeom prst="roundRect">
+            <a:avLst>
+              <a:gd name="adj" fmla="val 8406"/>
+            </a:avLst>
+          </a:prstGeom>
+          <a:solidFill>
+            <a:srgbClr val="0A0A0A"/>
+          </a:solidFill>
+          <a:ln>
+            <a:noFill/>
+          </a:ln>
+          <a:effectLst>
+            <a:outerShdw blurRad="38100" dist="25400" dir="13500000" algn="br" rotWithShape="0">
+              <a:srgbClr val="FFFFFA">
+                <a:alpha val="30000"/>
+              </a:srgbClr>
+            </a:outerShdw>
+            <a:softEdge rad="0"/>
+          </a:effectLst>
+        </p:spPr>
+        <p:style>
+          <a:lnRef idx="2">
+            <a:schemeClr val="accent1">
+              <a:shade val="15000"/>
+            </a:schemeClr>
+          </a:lnRef>
+          <a:fillRef idx="1">
+            <a:schemeClr val="accent1"/>
+          </a:fillRef>
+          <a:effectRef idx="0">
+            <a:schemeClr val="accent1"/>
+          </a:effectRef>
+          <a:fontRef idx="minor">
+            <a:schemeClr val="lt1"/>
+          </a:fontRef>
+        </p:style>
+        <p:txBody>
+          <a:bodyPr rtlCol="0" anchor="ctr"/>
+          <a:lstStyle/>
+          <a:p>
+            <a:pPr algn="ctr"/>
+            <a:endParaRPr lang="pl-PL"/>
+          </a:p>
+        </p:txBody>
+      </p:sp>
+      <p:sp>
+        <p:nvSpPr>
+          <p:cNvPr id="9" name="Bar - EbCG BG">
+            <a:extLst>
+              <a:ext uri="{FF2B5EF4-FFF2-40B4-BE49-F238E27FC236}">
+                <a16:creationId xmlns:a16="http://schemas.microsoft.com/office/drawing/2014/main" id="{D990526A-E8A5-6E26-A439-C90B9157EA6F}"/>
+              </a:ext>
+            </a:extLst>
+          </p:cNvPr>
+          <p:cNvSpPr/>
+          <p:nvPr/>
+        </p:nvSpPr>
+        <p:spPr>
+          <a:xfrm>
+            <a:off x="279401" y="10900568"/>
+            <a:ext cx="8953500" cy="4000500"/>
+          </a:xfrm>
+          <a:prstGeom prst="roundRect">
+            <a:avLst>
+              <a:gd name="adj" fmla="val 8406"/>
+            </a:avLst>
+          </a:prstGeom>
+          <a:solidFill>
+            <a:srgbClr val="0A0A0A"/>
+          </a:solidFill>
+          <a:ln>
+            <a:noFill/>
+          </a:ln>
+          <a:effectLst>
+            <a:outerShdw blurRad="38100" dist="25400" dir="13500000" algn="br" rotWithShape="0">
+              <a:srgbClr val="FFFFFA">
+                <a:alpha val="30000"/>
+              </a:srgbClr>
+            </a:outerShdw>
+            <a:softEdge rad="0"/>
+          </a:effectLst>
+        </p:spPr>
+        <p:style>
+          <a:lnRef idx="2">
+            <a:schemeClr val="accent1">
+              <a:shade val="15000"/>
+            </a:schemeClr>
+          </a:lnRef>
+          <a:fillRef idx="1">
+            <a:schemeClr val="accent1"/>
+          </a:fillRef>
+          <a:effectRef idx="0">
+            <a:schemeClr val="accent1"/>
+          </a:effectRef>
+          <a:fontRef idx="minor">
+            <a:schemeClr val="lt1"/>
+          </a:fontRef>
+        </p:style>
+        <p:txBody>
+          <a:bodyPr rtlCol="0" anchor="ctr"/>
+          <a:lstStyle/>
+          <a:p>
+            <a:pPr algn="ctr"/>
+            <a:endParaRPr lang="pl-PL"/>
+          </a:p>
+        </p:txBody>
+      </p:sp>
+      <p:sp>
+        <p:nvSpPr>
+          <p:cNvPr id="8" name="Bar - EbC BG">
+            <a:extLst>
+              <a:ext uri="{FF2B5EF4-FFF2-40B4-BE49-F238E27FC236}">
+                <a16:creationId xmlns:a16="http://schemas.microsoft.com/office/drawing/2014/main" id="{FE93D96C-6608-5F73-813F-F422668FD7F0}"/>
+              </a:ext>
+            </a:extLst>
+          </p:cNvPr>
+          <p:cNvSpPr/>
+          <p:nvPr/>
+        </p:nvSpPr>
+        <p:spPr>
+          <a:xfrm>
+            <a:off x="292100" y="6751637"/>
+            <a:ext cx="8953500" cy="4000500"/>
+          </a:xfrm>
+          <a:prstGeom prst="roundRect">
+            <a:avLst>
+              <a:gd name="adj" fmla="val 8406"/>
+            </a:avLst>
+          </a:prstGeom>
+          <a:solidFill>
+            <a:srgbClr val="0A0A0A"/>
+          </a:solidFill>
+          <a:ln>
+            <a:noFill/>
+          </a:ln>
+          <a:effectLst>
+            <a:outerShdw blurRad="38100" dist="25400" dir="13500000" algn="br" rotWithShape="0">
+              <a:srgbClr val="FFFFFA">
+                <a:alpha val="30000"/>
+              </a:srgbClr>
+            </a:outerShdw>
+            <a:softEdge rad="0"/>
+          </a:effectLst>
+        </p:spPr>
+        <p:style>
+          <a:lnRef idx="2">
+            <a:schemeClr val="accent1">
+              <a:shade val="15000"/>
+            </a:schemeClr>
+          </a:lnRef>
+          <a:fillRef idx="1">
+            <a:schemeClr val="accent1"/>
+          </a:fillRef>
+          <a:effectRef idx="0">
+            <a:schemeClr val="accent1"/>
+          </a:effectRef>
+          <a:fontRef idx="minor">
+            <a:schemeClr val="lt1"/>
+          </a:fontRef>
+        </p:style>
+        <p:txBody>
+          <a:bodyPr rtlCol="0" anchor="ctr"/>
+          <a:lstStyle/>
+          <a:p>
+            <a:pPr algn="ctr"/>
+            <a:endParaRPr lang="pl-PL"/>
+          </a:p>
+        </p:txBody>
+      </p:sp>
+      <p:sp>
+        <p:nvSpPr>
+          <p:cNvPr id="7" name="Box Plot - E BG">
+            <a:extLst>
+              <a:ext uri="{FF2B5EF4-FFF2-40B4-BE49-F238E27FC236}">
+                <a16:creationId xmlns:a16="http://schemas.microsoft.com/office/drawing/2014/main" id="{EBE042E4-FE06-7CA7-75B6-913B053E4ED8}"/>
+              </a:ext>
+            </a:extLst>
+          </p:cNvPr>
+          <p:cNvSpPr/>
+          <p:nvPr/>
+        </p:nvSpPr>
+        <p:spPr>
+          <a:xfrm>
+            <a:off x="6299199" y="2095500"/>
+            <a:ext cx="2952750" cy="4381500"/>
+          </a:xfrm>
+          <a:prstGeom prst="roundRect">
+            <a:avLst>
+              <a:gd name="adj" fmla="val 8406"/>
+            </a:avLst>
+          </a:prstGeom>
+          <a:solidFill>
+            <a:srgbClr val="0A0A0A"/>
+          </a:solidFill>
+          <a:ln>
+            <a:noFill/>
+          </a:ln>
+          <a:effectLst>
+            <a:outerShdw blurRad="38100" dist="25400" dir="13500000" algn="br" rotWithShape="0">
+              <a:srgbClr val="FFFFFA">
+                <a:alpha val="30000"/>
+              </a:srgbClr>
+            </a:outerShdw>
+            <a:softEdge rad="0"/>
+          </a:effectLst>
+        </p:spPr>
+        <p:style>
+          <a:lnRef idx="2">
+            <a:schemeClr val="accent1">
+              <a:shade val="15000"/>
+            </a:schemeClr>
+          </a:lnRef>
+          <a:fillRef idx="1">
+            <a:schemeClr val="accent1"/>
+          </a:fillRef>
+          <a:effectRef idx="0">
+            <a:schemeClr val="accent1"/>
+          </a:effectRef>
+          <a:fontRef idx="minor">
+            <a:schemeClr val="lt1"/>
+          </a:fontRef>
+        </p:style>
+        <p:txBody>
+          <a:bodyPr rtlCol="0" anchor="ctr"/>
+          <a:lstStyle/>
+          <a:p>
+            <a:pPr algn="ctr"/>
+            <a:endParaRPr lang="pl-PL"/>
+          </a:p>
+        </p:txBody>
+      </p:sp>
+      <p:sp>
+        <p:nvSpPr>
+          <p:cNvPr id="6" name="Map - EbC BG">
+            <a:extLst>
+              <a:ext uri="{FF2B5EF4-FFF2-40B4-BE49-F238E27FC236}">
+                <a16:creationId xmlns:a16="http://schemas.microsoft.com/office/drawing/2014/main" id="{6DADB79C-D0B9-2F4B-C240-8F32EFF0ACB2}"/>
+              </a:ext>
+            </a:extLst>
+          </p:cNvPr>
+          <p:cNvSpPr/>
+          <p:nvPr/>
+        </p:nvSpPr>
+        <p:spPr>
+          <a:xfrm>
+            <a:off x="292100" y="2095500"/>
+            <a:ext cx="5715000" cy="4381500"/>
+          </a:xfrm>
+          <a:prstGeom prst="roundRect">
+            <a:avLst>
+              <a:gd name="adj" fmla="val 8406"/>
+            </a:avLst>
+          </a:prstGeom>
+          <a:solidFill>
+            <a:srgbClr val="0A0A0A"/>
+          </a:solidFill>
+          <a:ln>
+            <a:noFill/>
+          </a:ln>
+          <a:effectLst>
+            <a:outerShdw blurRad="38100" dist="25400" dir="13500000" algn="br" rotWithShape="0">
+              <a:srgbClr val="FFFFFA">
+                <a:alpha val="30000"/>
+              </a:srgbClr>
+            </a:outerShdw>
+            <a:softEdge rad="0"/>
+          </a:effectLst>
+        </p:spPr>
+        <p:style>
+          <a:lnRef idx="2">
+            <a:schemeClr val="accent1">
+              <a:shade val="15000"/>
+            </a:schemeClr>
+          </a:lnRef>
+          <a:fillRef idx="1">
+            <a:schemeClr val="accent1"/>
+          </a:fillRef>
+          <a:effectRef idx="0">
+            <a:schemeClr val="accent1"/>
+          </a:effectRef>
+          <a:fontRef idx="minor">
+            <a:schemeClr val="lt1"/>
+          </a:fontRef>
+        </p:style>
+        <p:txBody>
+          <a:bodyPr rtlCol="0" anchor="ctr"/>
+          <a:lstStyle/>
+          <a:p>
+            <a:pPr algn="ctr"/>
+            <a:endParaRPr lang="pl-PL"/>
+          </a:p>
+        </p:txBody>
+      </p:sp>
+      <p:sp>
+        <p:nvSpPr>
+          <p:cNvPr id="17" name="Slicer Pane BG">
+            <a:extLst>
+              <a:ext uri="{FF2B5EF4-FFF2-40B4-BE49-F238E27FC236}">
+                <a16:creationId xmlns:a16="http://schemas.microsoft.com/office/drawing/2014/main" id="{421C15B2-FB6F-EA1A-DD88-5D5473E695CC}"/>
+              </a:ext>
+            </a:extLst>
+          </p:cNvPr>
+          <p:cNvSpPr/>
+          <p:nvPr/>
+        </p:nvSpPr>
+        <p:spPr>
+          <a:xfrm>
+            <a:off x="142876" y="754063"/>
+            <a:ext cx="9239250" cy="1047750"/>
+          </a:xfrm>
+          <a:prstGeom prst="roundRect">
+            <a:avLst>
+              <a:gd name="adj" fmla="val 27875"/>
+            </a:avLst>
+          </a:prstGeom>
+          <a:solidFill>
+            <a:srgbClr val="0A0A0A"/>
+          </a:solidFill>
+          <a:ln>
+            <a:noFill/>
+          </a:ln>
+          <a:effectLst>
+            <a:outerShdw blurRad="38100" dist="25400" dir="13500000" algn="br" rotWithShape="0">
+              <a:srgbClr val="FFFFFA">
+                <a:alpha val="30000"/>
+              </a:srgbClr>
+            </a:outerShdw>
+            <a:softEdge rad="0"/>
+          </a:effectLst>
+        </p:spPr>
+        <p:style>
+          <a:lnRef idx="2">
+            <a:schemeClr val="accent1">
+              <a:shade val="15000"/>
+            </a:schemeClr>
+          </a:lnRef>
+          <a:fillRef idx="1">
+            <a:schemeClr val="accent1"/>
+          </a:fillRef>
+          <a:effectRef idx="0">
+            <a:schemeClr val="accent1"/>
+          </a:effectRef>
+          <a:fontRef idx="minor">
+            <a:schemeClr val="lt1"/>
+          </a:fontRef>
+        </p:style>
+        <p:txBody>
+          <a:bodyPr rtlCol="0" anchor="ctr"/>
+          <a:lstStyle/>
+          <a:p>
+            <a:pPr algn="ctr"/>
+            <a:endParaRPr lang="pl-PL"/>
+          </a:p>
+        </p:txBody>
+      </p:sp>
+      <p:sp>
+        <p:nvSpPr>
+          <p:cNvPr id="19" name="Header &amp; Nav BG">
+            <a:extLst>
+              <a:ext uri="{FF2B5EF4-FFF2-40B4-BE49-F238E27FC236}">
+                <a16:creationId xmlns:a16="http://schemas.microsoft.com/office/drawing/2014/main" id="{71CC0687-5C6B-6AC3-0E30-B0EFA4575A49}"/>
+              </a:ext>
+            </a:extLst>
+          </p:cNvPr>
+          <p:cNvSpPr/>
+          <p:nvPr/>
+        </p:nvSpPr>
+        <p:spPr>
+          <a:xfrm>
+            <a:off x="0" y="0"/>
+            <a:ext cx="9525000" cy="666750"/>
+          </a:xfrm>
+          <a:prstGeom prst="rect">
+            <a:avLst/>
+          </a:prstGeom>
+          <a:solidFill>
+            <a:srgbClr val="0A0A0A"/>
+          </a:solidFill>
+          <a:ln>
+            <a:noFill/>
+          </a:ln>
+          <a:effectLst>
+            <a:outerShdw blurRad="12700" dist="12700" dir="5400000" algn="t" rotWithShape="0">
+              <a:srgbClr val="FFFFFA">
+                <a:alpha val="20000"/>
+              </a:srgbClr>
+            </a:outerShdw>
+          </a:effectLst>
+        </p:spPr>
+        <p:style>
+          <a:lnRef idx="2">
+            <a:schemeClr val="accent1">
+              <a:shade val="15000"/>
+            </a:schemeClr>
+          </a:lnRef>
+          <a:fillRef idx="1">
+            <a:schemeClr val="accent1"/>
+          </a:fillRef>
+          <a:effectRef idx="0">
+            <a:schemeClr val="accent1"/>
+          </a:effectRef>
+          <a:fontRef idx="minor">
+            <a:schemeClr val="lt1"/>
+          </a:fontRef>
+        </p:style>
+        <p:txBody>
+          <a:bodyPr rtlCol="0" anchor="ctr"/>
+          <a:lstStyle/>
+          <a:p>
+            <a:pPr algn="ctr"/>
+            <a:endParaRPr lang="pl-PL"/>
+          </a:p>
+        </p:txBody>
+      </p:sp>
+      <p:sp>
+        <p:nvSpPr>
+          <p:cNvPr id="36" name="Overview Button">
+            <a:extLst>
+              <a:ext uri="{FF2B5EF4-FFF2-40B4-BE49-F238E27FC236}">
+                <a16:creationId xmlns:a16="http://schemas.microsoft.com/office/drawing/2014/main" id="{BA9B3771-2A75-EFA6-5422-FDF442D13B20}"/>
+              </a:ext>
+            </a:extLst>
+          </p:cNvPr>
+          <p:cNvSpPr/>
+          <p:nvPr/>
+        </p:nvSpPr>
+        <p:spPr>
+          <a:xfrm>
+            <a:off x="5932887" y="98032"/>
+            <a:ext cx="1678781" cy="459575"/>
+          </a:xfrm>
+          <a:prstGeom prst="roundRect">
+            <a:avLst/>
+          </a:prstGeom>
+        </p:spPr>
+        <p:style>
+          <a:lnRef idx="2">
+            <a:schemeClr val="accent1">
+              <a:shade val="15000"/>
+            </a:schemeClr>
+          </a:lnRef>
+          <a:fillRef idx="1">
+            <a:schemeClr val="accent1"/>
+          </a:fillRef>
+          <a:effectRef idx="0">
+            <a:schemeClr val="accent1"/>
+          </a:effectRef>
+          <a:fontRef idx="minor">
+            <a:schemeClr val="lt1"/>
+          </a:fontRef>
+        </p:style>
+        <p:txBody>
+          <a:bodyPr rtlCol="0" anchor="ctr"/>
+          <a:lstStyle/>
+          <a:p>
+            <a:pPr algn="ctr"/>
+            <a:endParaRPr lang="pl-PL"/>
+          </a:p>
+        </p:txBody>
+      </p:sp>
+      <p:sp>
+        <p:nvSpPr>
+          <p:cNvPr id="34" name="Landing Button">
+            <a:extLst>
+              <a:ext uri="{FF2B5EF4-FFF2-40B4-BE49-F238E27FC236}">
+                <a16:creationId xmlns:a16="http://schemas.microsoft.com/office/drawing/2014/main" id="{EE2E2CDA-F2A2-DD43-7926-A90DA8C05E8B}"/>
+              </a:ext>
+            </a:extLst>
+          </p:cNvPr>
+          <p:cNvSpPr/>
+          <p:nvPr/>
+        </p:nvSpPr>
+        <p:spPr>
+          <a:xfrm>
+            <a:off x="4143376" y="98032"/>
+            <a:ext cx="1678781" cy="459575"/>
+          </a:xfrm>
+          <a:prstGeom prst="roundRect">
+            <a:avLst/>
+          </a:prstGeom>
+        </p:spPr>
+        <p:style>
+          <a:lnRef idx="2">
+            <a:schemeClr val="accent1">
+              <a:shade val="15000"/>
+            </a:schemeClr>
+          </a:lnRef>
+          <a:fillRef idx="1">
+            <a:schemeClr val="accent1"/>
+          </a:fillRef>
+          <a:effectRef idx="0">
+            <a:schemeClr val="accent1"/>
+          </a:effectRef>
+          <a:fontRef idx="minor">
+            <a:schemeClr val="lt1"/>
+          </a:fontRef>
+        </p:style>
+        <p:txBody>
+          <a:bodyPr rtlCol="0" anchor="ctr"/>
+          <a:lstStyle/>
+          <a:p>
+            <a:pPr algn="ctr"/>
+            <a:endParaRPr lang="pl-PL"/>
+          </a:p>
+        </p:txBody>
+      </p:sp>
+      <p:sp>
+        <p:nvSpPr>
+          <p:cNvPr id="35" name="Occupation Button">
+            <a:extLst>
+              <a:ext uri="{FF2B5EF4-FFF2-40B4-BE49-F238E27FC236}">
+                <a16:creationId xmlns:a16="http://schemas.microsoft.com/office/drawing/2014/main" id="{CC6C60F4-3049-552F-777F-AA1530A3A607}"/>
+              </a:ext>
+            </a:extLst>
+          </p:cNvPr>
+          <p:cNvSpPr/>
+          <p:nvPr/>
+        </p:nvSpPr>
+        <p:spPr>
+          <a:xfrm>
+            <a:off x="7721601" y="105975"/>
+            <a:ext cx="1678781" cy="459575"/>
+          </a:xfrm>
+          <a:prstGeom prst="roundRect">
+            <a:avLst/>
+          </a:prstGeom>
+        </p:spPr>
+        <p:style>
+          <a:lnRef idx="2">
+            <a:schemeClr val="accent1">
+              <a:shade val="15000"/>
+            </a:schemeClr>
+          </a:lnRef>
+          <a:fillRef idx="1">
+            <a:schemeClr val="accent1"/>
+          </a:fillRef>
+          <a:effectRef idx="0">
+            <a:schemeClr val="accent1"/>
+          </a:effectRef>
+          <a:fontRef idx="minor">
+            <a:schemeClr val="lt1"/>
+          </a:fontRef>
+        </p:style>
+        <p:txBody>
+          <a:bodyPr rtlCol="0" anchor="ctr"/>
+          <a:lstStyle/>
+          <a:p>
+            <a:pPr algn="ctr"/>
+            <a:endParaRPr lang="pl-PL"/>
+          </a:p>
+        </p:txBody>
+      </p:sp>
+      <p:pic>
+        <p:nvPicPr>
+          <p:cNvPr id="5" name="Picture 4" descr="A screenshot of a graph&#10;&#10;Description automatically generated">
+            <a:extLst>
+              <a:ext uri="{FF2B5EF4-FFF2-40B4-BE49-F238E27FC236}">
+                <a16:creationId xmlns:a16="http://schemas.microsoft.com/office/drawing/2014/main" id="{38C3D90F-3481-2DB7-5351-B79A1A42DB1B}"/>
+              </a:ext>
+            </a:extLst>
+          </p:cNvPr>
+          <p:cNvPicPr>
+            <a:picLocks noChangeAspect="1"/>
+          </p:cNvPicPr>
+          <p:nvPr/>
+        </p:nvPicPr>
+        <p:blipFill>
+          <a:blip r:embed="rId6">
+            <a:alphaModFix amt="20000"/>
+            <a:extLst>
+              <a:ext uri="{28A0092B-C50C-407E-A947-70E740481C1C}">
+                <a14:useLocalDpi xmlns:a14="http://schemas.microsoft.com/office/drawing/2010/main" val="0"/>
+              </a:ext>
+            </a:extLst>
+          </a:blip>
+          <a:stretch>
+            <a:fillRect/>
+          </a:stretch>
+        </p:blipFill>
+        <p:spPr>
+          <a:xfrm>
+            <a:off x="1" y="3"/>
+            <a:ext cx="9525000" cy="29384622"/>
+          </a:xfrm>
+          <a:prstGeom prst="rect">
+            <a:avLst/>
+          </a:prstGeom>
+        </p:spPr>
+      </p:pic>
+    </p:spTree>
+    <p:extLst>
+      <p:ext uri="{BB962C8B-B14F-4D97-AF65-F5344CB8AC3E}">
+        <p14:creationId xmlns:p14="http://schemas.microsoft.com/office/powerpoint/2010/main" val="866568064"/>
+      </p:ext>
+    </p:extLst>
+  </p:cSld>
+  <p:clrMapOvr>
+    <a:masterClrMapping/>
+  </p:clrMapOvr>
+</p:sld>
+</file>
+
+<file path=ppt/slides/slide2.xml><?xml version="1.0" encoding="utf-8"?>
+<p:sld xmlns:a="http://schemas.openxmlformats.org/drawingml/2006/main" xmlns:r="http://schemas.openxmlformats.org/officeDocument/2006/relationships" xmlns:p="http://schemas.openxmlformats.org/presentationml/2006/main">
+  <p:cSld>
+    <p:bg>
+      <p:bgPr>
         <a:gradFill flip="none" rotWithShape="1">
           <a:gsLst>
             <a:gs pos="9000">
@@ -2991,98 +4254,6 @@
           <a:chExt cx="0" cy="0"/>
         </a:xfrm>
       </p:grpSpPr>
-      <p:sp>
-        <p:nvSpPr>
-          <p:cNvPr id="7" name="Rectangle 6">
-            <a:extLst>
-              <a:ext uri="{FF2B5EF4-FFF2-40B4-BE49-F238E27FC236}">
-                <a16:creationId xmlns:a16="http://schemas.microsoft.com/office/drawing/2014/main" id="{FC07BBB3-E5AD-962D-101F-72823CD9269F}"/>
-              </a:ext>
-            </a:extLst>
-          </p:cNvPr>
-          <p:cNvSpPr/>
-          <p:nvPr/>
-        </p:nvSpPr>
-        <p:spPr>
-          <a:xfrm>
-            <a:off x="0" y="0"/>
-            <a:ext cx="9525000" cy="901700"/>
-          </a:xfrm>
-          <a:prstGeom prst="rect">
-            <a:avLst/>
-          </a:prstGeom>
-        </p:spPr>
-        <p:style>
-          <a:lnRef idx="2">
-            <a:schemeClr val="dk1">
-              <a:shade val="15000"/>
-            </a:schemeClr>
-          </a:lnRef>
-          <a:fillRef idx="1">
-            <a:schemeClr val="dk1"/>
-          </a:fillRef>
-          <a:effectRef idx="0">
-            <a:schemeClr val="dk1"/>
-          </a:effectRef>
-          <a:fontRef idx="minor">
-            <a:schemeClr val="lt1"/>
-          </a:fontRef>
-        </p:style>
-        <p:txBody>
-          <a:bodyPr rtlCol="0" anchor="ctr"/>
-          <a:lstStyle/>
-          <a:p>
-            <a:pPr algn="ctr"/>
-            <a:endParaRPr lang="pl-PL" dirty="0"/>
-          </a:p>
-        </p:txBody>
-      </p:sp>
-      <p:sp>
-        <p:nvSpPr>
-          <p:cNvPr id="8" name="Rectangle 7">
-            <a:extLst>
-              <a:ext uri="{FF2B5EF4-FFF2-40B4-BE49-F238E27FC236}">
-                <a16:creationId xmlns:a16="http://schemas.microsoft.com/office/drawing/2014/main" id="{456A78CA-7644-ACF5-AF62-091E1BEA7297}"/>
-              </a:ext>
-            </a:extLst>
-          </p:cNvPr>
-          <p:cNvSpPr/>
-          <p:nvPr/>
-        </p:nvSpPr>
-        <p:spPr>
-          <a:xfrm>
-            <a:off x="206374" y="1055423"/>
-            <a:ext cx="9102725" cy="901700"/>
-          </a:xfrm>
-          <a:prstGeom prst="rect">
-            <a:avLst/>
-          </a:prstGeom>
-        </p:spPr>
-        <p:style>
-          <a:lnRef idx="2">
-            <a:schemeClr val="dk1">
-              <a:shade val="15000"/>
-            </a:schemeClr>
-          </a:lnRef>
-          <a:fillRef idx="1">
-            <a:schemeClr val="dk1"/>
-          </a:fillRef>
-          <a:effectRef idx="0">
-            <a:schemeClr val="dk1"/>
-          </a:effectRef>
-          <a:fontRef idx="minor">
-            <a:schemeClr val="lt1"/>
-          </a:fontRef>
-        </p:style>
-        <p:txBody>
-          <a:bodyPr rtlCol="0" anchor="ctr"/>
-          <a:lstStyle/>
-          <a:p>
-            <a:pPr algn="ctr"/>
-            <a:endParaRPr lang="pl-PL" dirty="0"/>
-          </a:p>
-        </p:txBody>
-      </p:sp>
     </p:spTree>
     <p:extLst>
       <p:ext uri="{BB962C8B-B14F-4D97-AF65-F5344CB8AC3E}">

</xml_diff>

<commit_message>
Avg. Monthly Earnings Project - Landing page implemented
</commit_message>
<xml_diff>
--- a/PowerBI/Projects/Average Monthly Earnings EU/Backgrounds/Backgrounds.pptx
+++ b/PowerBI/Projects/Average Monthly Earnings EU/Backgrounds/Backgrounds.pptx
@@ -5,8 +5,7 @@
     <p:sldMasterId id="2147483672" r:id="rId1"/>
   </p:sldMasterIdLst>
   <p:sldIdLst>
-    <p:sldId id="257" r:id="rId2"/>
-    <p:sldId id="256" r:id="rId3"/>
+    <p:sldId id="256" r:id="rId2"/>
   </p:sldIdLst>
   <p:sldSz cx="9525000" cy="29384625"/>
   <p:notesSz cx="6858000" cy="9144000"/>
@@ -244,7 +243,7 @@
           <a:p>
             <a:fld id="{2AE88528-DDCC-4DB1-844C-DD3FEDD6CA17}" type="datetimeFigureOut">
               <a:rPr lang="pl-PL" smtClean="0"/>
-              <a:t>2024-02-04</a:t>
+              <a:t>2024-02-11</a:t>
             </a:fld>
             <a:endParaRPr lang="pl-PL"/>
           </a:p>
@@ -414,7 +413,7 @@
           <a:p>
             <a:fld id="{2AE88528-DDCC-4DB1-844C-DD3FEDD6CA17}" type="datetimeFigureOut">
               <a:rPr lang="pl-PL" smtClean="0"/>
-              <a:t>2024-02-04</a:t>
+              <a:t>2024-02-11</a:t>
             </a:fld>
             <a:endParaRPr lang="pl-PL"/>
           </a:p>
@@ -594,7 +593,7 @@
           <a:p>
             <a:fld id="{2AE88528-DDCC-4DB1-844C-DD3FEDD6CA17}" type="datetimeFigureOut">
               <a:rPr lang="pl-PL" smtClean="0"/>
-              <a:t>2024-02-04</a:t>
+              <a:t>2024-02-11</a:t>
             </a:fld>
             <a:endParaRPr lang="pl-PL"/>
           </a:p>
@@ -764,7 +763,7 @@
           <a:p>
             <a:fld id="{2AE88528-DDCC-4DB1-844C-DD3FEDD6CA17}" type="datetimeFigureOut">
               <a:rPr lang="pl-PL" smtClean="0"/>
-              <a:t>2024-02-04</a:t>
+              <a:t>2024-02-11</a:t>
             </a:fld>
             <a:endParaRPr lang="pl-PL"/>
           </a:p>
@@ -1008,7 +1007,7 @@
           <a:p>
             <a:fld id="{2AE88528-DDCC-4DB1-844C-DD3FEDD6CA17}" type="datetimeFigureOut">
               <a:rPr lang="pl-PL" smtClean="0"/>
-              <a:t>2024-02-04</a:t>
+              <a:t>2024-02-11</a:t>
             </a:fld>
             <a:endParaRPr lang="pl-PL"/>
           </a:p>
@@ -1240,7 +1239,7 @@
           <a:p>
             <a:fld id="{2AE88528-DDCC-4DB1-844C-DD3FEDD6CA17}" type="datetimeFigureOut">
               <a:rPr lang="pl-PL" smtClean="0"/>
-              <a:t>2024-02-04</a:t>
+              <a:t>2024-02-11</a:t>
             </a:fld>
             <a:endParaRPr lang="pl-PL"/>
           </a:p>
@@ -1607,7 +1606,7 @@
           <a:p>
             <a:fld id="{2AE88528-DDCC-4DB1-844C-DD3FEDD6CA17}" type="datetimeFigureOut">
               <a:rPr lang="pl-PL" smtClean="0"/>
-              <a:t>2024-02-04</a:t>
+              <a:t>2024-02-11</a:t>
             </a:fld>
             <a:endParaRPr lang="pl-PL"/>
           </a:p>
@@ -1725,7 +1724,7 @@
           <a:p>
             <a:fld id="{2AE88528-DDCC-4DB1-844C-DD3FEDD6CA17}" type="datetimeFigureOut">
               <a:rPr lang="pl-PL" smtClean="0"/>
-              <a:t>2024-02-04</a:t>
+              <a:t>2024-02-11</a:t>
             </a:fld>
             <a:endParaRPr lang="pl-PL"/>
           </a:p>
@@ -1820,7 +1819,7 @@
           <a:p>
             <a:fld id="{2AE88528-DDCC-4DB1-844C-DD3FEDD6CA17}" type="datetimeFigureOut">
               <a:rPr lang="pl-PL" smtClean="0"/>
-              <a:t>2024-02-04</a:t>
+              <a:t>2024-02-11</a:t>
             </a:fld>
             <a:endParaRPr lang="pl-PL"/>
           </a:p>
@@ -2097,7 +2096,7 @@
           <a:p>
             <a:fld id="{2AE88528-DDCC-4DB1-844C-DD3FEDD6CA17}" type="datetimeFigureOut">
               <a:rPr lang="pl-PL" smtClean="0"/>
-              <a:t>2024-02-04</a:t>
+              <a:t>2024-02-11</a:t>
             </a:fld>
             <a:endParaRPr lang="pl-PL"/>
           </a:p>
@@ -2354,7 +2353,7 @@
           <a:p>
             <a:fld id="{2AE88528-DDCC-4DB1-844C-DD3FEDD6CA17}" type="datetimeFigureOut">
               <a:rPr lang="pl-PL" smtClean="0"/>
-              <a:t>2024-02-04</a:t>
+              <a:t>2024-02-11</a:t>
             </a:fld>
             <a:endParaRPr lang="pl-PL"/>
           </a:p>
@@ -2567,7 +2566,7 @@
           <a:p>
             <a:fld id="{2AE88528-DDCC-4DB1-844C-DD3FEDD6CA17}" type="datetimeFigureOut">
               <a:rPr lang="pl-PL" smtClean="0"/>
-              <a:t>2024-02-04</a:t>
+              <a:t>2024-02-11</a:t>
             </a:fld>
             <a:endParaRPr lang="pl-PL"/>
           </a:p>
@@ -2956,1263 +2955,6 @@
 </file>
 
 <file path=ppt/slides/slide1.xml><?xml version="1.0" encoding="utf-8"?>
-<p:sld xmlns:a="http://schemas.openxmlformats.org/drawingml/2006/main" xmlns:r="http://schemas.openxmlformats.org/officeDocument/2006/relationships" xmlns:p="http://schemas.openxmlformats.org/presentationml/2006/main">
-  <p:cSld>
-    <p:bg>
-      <p:bgPr>
-        <a:gradFill>
-          <a:gsLst>
-            <a:gs pos="43000">
-              <a:srgbClr val="870EA0">
-                <a:lumMod val="93000"/>
-                <a:lumOff val="7000"/>
-              </a:srgbClr>
-            </a:gs>
-            <a:gs pos="9000">
-              <a:srgbClr val="300539">
-                <a:lumMod val="75000"/>
-                <a:lumOff val="25000"/>
-              </a:srgbClr>
-            </a:gs>
-            <a:gs pos="90000">
-              <a:srgbClr val="200326">
-                <a:lumMod val="90000"/>
-                <a:lumOff val="10000"/>
-              </a:srgbClr>
-            </a:gs>
-          </a:gsLst>
-          <a:path path="circle">
-            <a:fillToRect t="100000" r="100000"/>
-          </a:path>
-        </a:gradFill>
-        <a:effectLst/>
-      </p:bgPr>
-    </p:bg>
-    <p:spTree>
-      <p:nvGrpSpPr>
-        <p:cNvPr id="1" name=""/>
-        <p:cNvGrpSpPr/>
-        <p:nvPr/>
-      </p:nvGrpSpPr>
-      <p:grpSpPr>
-        <a:xfrm>
-          <a:off x="0" y="0"/>
-          <a:ext cx="0" cy="0"/>
-          <a:chOff x="0" y="0"/>
-          <a:chExt cx="0" cy="0"/>
-        </a:xfrm>
-      </p:grpSpPr>
-      <p:grpSp>
-        <p:nvGrpSpPr>
-          <p:cNvPr id="33" name="Footer">
-            <a:extLst>
-              <a:ext uri="{FF2B5EF4-FFF2-40B4-BE49-F238E27FC236}">
-                <a16:creationId xmlns:a16="http://schemas.microsoft.com/office/drawing/2014/main" id="{291DC8C4-DC8B-66F8-CB75-AF65561B373B}"/>
-              </a:ext>
-            </a:extLst>
-          </p:cNvPr>
-          <p:cNvGrpSpPr/>
-          <p:nvPr/>
-        </p:nvGrpSpPr>
-        <p:grpSpPr>
-          <a:xfrm>
-            <a:off x="1" y="29001241"/>
-            <a:ext cx="9525000" cy="381000"/>
-            <a:chOff x="1" y="29001241"/>
-            <a:chExt cx="9525000" cy="381000"/>
-          </a:xfrm>
-        </p:grpSpPr>
-        <p:sp>
-          <p:nvSpPr>
-            <p:cNvPr id="23" name="Footer BG">
-              <a:extLst>
-                <a:ext uri="{FF2B5EF4-FFF2-40B4-BE49-F238E27FC236}">
-                  <a16:creationId xmlns:a16="http://schemas.microsoft.com/office/drawing/2014/main" id="{67150049-20EF-661A-76FC-4DD536216C16}"/>
-                </a:ext>
-              </a:extLst>
-            </p:cNvPr>
-            <p:cNvSpPr/>
-            <p:nvPr/>
-          </p:nvSpPr>
-          <p:spPr>
-            <a:xfrm>
-              <a:off x="1" y="29001241"/>
-              <a:ext cx="9525000" cy="381000"/>
-            </a:xfrm>
-            <a:prstGeom prst="rect">
-              <a:avLst/>
-            </a:prstGeom>
-            <a:solidFill>
-              <a:srgbClr val="0A0A0A"/>
-            </a:solidFill>
-            <a:ln>
-              <a:noFill/>
-            </a:ln>
-          </p:spPr>
-          <p:style>
-            <a:lnRef idx="2">
-              <a:schemeClr val="accent1">
-                <a:shade val="15000"/>
-              </a:schemeClr>
-            </a:lnRef>
-            <a:fillRef idx="1">
-              <a:schemeClr val="accent1"/>
-            </a:fillRef>
-            <a:effectRef idx="0">
-              <a:schemeClr val="accent1"/>
-            </a:effectRef>
-            <a:fontRef idx="minor">
-              <a:schemeClr val="lt1"/>
-            </a:fontRef>
-          </p:style>
-          <p:txBody>
-            <a:bodyPr rtlCol="0" anchor="ctr"/>
-            <a:lstStyle/>
-            <a:p>
-              <a:pPr algn="ctr"/>
-              <a:endParaRPr lang="pl-PL"/>
-            </a:p>
-          </p:txBody>
-        </p:sp>
-        <p:sp>
-          <p:nvSpPr>
-            <p:cNvPr id="30" name="Footer text">
-              <a:extLst>
-                <a:ext uri="{FF2B5EF4-FFF2-40B4-BE49-F238E27FC236}">
-                  <a16:creationId xmlns:a16="http://schemas.microsoft.com/office/drawing/2014/main" id="{B9A539E9-87F6-27AA-C790-709BCB98EC12}"/>
-                </a:ext>
-              </a:extLst>
-            </p:cNvPr>
-            <p:cNvSpPr/>
-            <p:nvPr/>
-          </p:nvSpPr>
-          <p:spPr>
-            <a:xfrm>
-              <a:off x="476250" y="29094106"/>
-              <a:ext cx="8572500" cy="190500"/>
-            </a:xfrm>
-            <a:prstGeom prst="rect">
-              <a:avLst/>
-            </a:prstGeom>
-            <a:solidFill>
-              <a:srgbClr val="0A0A0A"/>
-            </a:solidFill>
-            <a:ln>
-              <a:noFill/>
-            </a:ln>
-          </p:spPr>
-          <p:style>
-            <a:lnRef idx="2">
-              <a:schemeClr val="accent1">
-                <a:shade val="15000"/>
-              </a:schemeClr>
-            </a:lnRef>
-            <a:fillRef idx="1">
-              <a:schemeClr val="accent1"/>
-            </a:fillRef>
-            <a:effectRef idx="0">
-              <a:schemeClr val="accent1"/>
-            </a:effectRef>
-            <a:fontRef idx="minor">
-              <a:schemeClr val="lt1"/>
-            </a:fontRef>
-          </p:style>
-          <p:txBody>
-            <a:bodyPr rtlCol="0" anchor="ctr"/>
-            <a:lstStyle/>
-            <a:p>
-              <a:r>
-                <a:rPr lang="pl-PL" sz="900" dirty="0" err="1">
-                  <a:latin typeface="Segoe UI" panose="020B0502040204020203" pitchFamily="34" charset="0"/>
-                  <a:cs typeface="Segoe UI" panose="020B0502040204020203" pitchFamily="34" charset="0"/>
-                </a:rPr>
-                <a:t>Created</a:t>
-              </a:r>
-              <a:r>
-                <a:rPr lang="pl-PL" sz="900" dirty="0">
-                  <a:latin typeface="Segoe UI" panose="020B0502040204020203" pitchFamily="34" charset="0"/>
-                  <a:cs typeface="Segoe UI" panose="020B0502040204020203" pitchFamily="34" charset="0"/>
-                </a:rPr>
-                <a:t> by – Mateusz Koniuch</a:t>
-              </a:r>
-            </a:p>
-          </p:txBody>
-        </p:sp>
-        <p:pic>
-          <p:nvPicPr>
-            <p:cNvPr id="21" name="Logo kon-mat" descr="A white letter on a black background&#10;&#10;Description automatically generated">
-              <a:extLst>
-                <a:ext uri="{FF2B5EF4-FFF2-40B4-BE49-F238E27FC236}">
-                  <a16:creationId xmlns:a16="http://schemas.microsoft.com/office/drawing/2014/main" id="{54A0EBF5-24BC-CF45-74CE-EE91A1BDD0D1}"/>
-                </a:ext>
-              </a:extLst>
-            </p:cNvPr>
-            <p:cNvPicPr>
-              <a:picLocks noChangeAspect="1"/>
-            </p:cNvPicPr>
-            <p:nvPr/>
-          </p:nvPicPr>
-          <p:blipFill>
-            <a:blip r:embed="rId2">
-              <a:extLst>
-                <a:ext uri="{28A0092B-C50C-407E-A947-70E740481C1C}">
-                  <a14:useLocalDpi xmlns:a14="http://schemas.microsoft.com/office/drawing/2010/main" val="0"/>
-                </a:ext>
-              </a:extLst>
-            </a:blip>
-            <a:stretch>
-              <a:fillRect/>
-            </a:stretch>
-          </p:blipFill>
-          <p:spPr>
-            <a:xfrm>
-              <a:off x="2149276" y="29113156"/>
-              <a:ext cx="153685" cy="152400"/>
-            </a:xfrm>
-            <a:prstGeom prst="rect">
-              <a:avLst/>
-            </a:prstGeom>
-          </p:spPr>
-        </p:pic>
-        <p:pic>
-          <p:nvPicPr>
-            <p:cNvPr id="27" name="Logo LinkedIn" descr="A blue square with white letters&#10;&#10;Description automatically generated">
-              <a:extLst>
-                <a:ext uri="{FF2B5EF4-FFF2-40B4-BE49-F238E27FC236}">
-                  <a16:creationId xmlns:a16="http://schemas.microsoft.com/office/drawing/2014/main" id="{494D8F7E-3A35-C427-19B1-2116C13EC32D}"/>
-                </a:ext>
-              </a:extLst>
-            </p:cNvPr>
-            <p:cNvPicPr>
-              <a:picLocks noChangeAspect="1"/>
-            </p:cNvPicPr>
-            <p:nvPr/>
-          </p:nvPicPr>
-          <p:blipFill>
-            <a:blip r:embed="rId3">
-              <a:extLst>
-                <a:ext uri="{28A0092B-C50C-407E-A947-70E740481C1C}">
-                  <a14:useLocalDpi xmlns:a14="http://schemas.microsoft.com/office/drawing/2010/main" val="0"/>
-                </a:ext>
-              </a:extLst>
-            </a:blip>
-            <a:stretch>
-              <a:fillRect/>
-            </a:stretch>
-          </p:blipFill>
-          <p:spPr>
-            <a:xfrm>
-              <a:off x="8765381" y="29094106"/>
-              <a:ext cx="190500" cy="190500"/>
-            </a:xfrm>
-            <a:prstGeom prst="rect">
-              <a:avLst/>
-            </a:prstGeom>
-          </p:spPr>
-        </p:pic>
-        <p:pic>
-          <p:nvPicPr>
-            <p:cNvPr id="25" name="Logo GitHub" descr="A black cat with a blue circle&#10;&#10;Description automatically generated">
-              <a:extLst>
-                <a:ext uri="{FF2B5EF4-FFF2-40B4-BE49-F238E27FC236}">
-                  <a16:creationId xmlns:a16="http://schemas.microsoft.com/office/drawing/2014/main" id="{30E31A2D-77B3-C687-8626-6051F68FAD90}"/>
-                </a:ext>
-              </a:extLst>
-            </p:cNvPr>
-            <p:cNvPicPr>
-              <a:picLocks noChangeAspect="1"/>
-            </p:cNvPicPr>
-            <p:nvPr/>
-          </p:nvPicPr>
-          <p:blipFill>
-            <a:blip r:embed="rId4">
-              <a:extLst>
-                <a:ext uri="{28A0092B-C50C-407E-A947-70E740481C1C}">
-                  <a14:useLocalDpi xmlns:a14="http://schemas.microsoft.com/office/drawing/2010/main" val="0"/>
-                </a:ext>
-              </a:extLst>
-            </a:blip>
-            <a:stretch>
-              <a:fillRect/>
-            </a:stretch>
-          </p:blipFill>
-          <p:spPr>
-            <a:xfrm>
-              <a:off x="8422610" y="29094106"/>
-              <a:ext cx="190500" cy="190500"/>
-            </a:xfrm>
-            <a:prstGeom prst="rect">
-              <a:avLst/>
-            </a:prstGeom>
-          </p:spPr>
-        </p:pic>
-        <p:pic>
-          <p:nvPicPr>
-            <p:cNvPr id="29" name="Logo Novy Pro" descr="A colorful logo with black background&#10;&#10;Description automatically generated">
-              <a:extLst>
-                <a:ext uri="{FF2B5EF4-FFF2-40B4-BE49-F238E27FC236}">
-                  <a16:creationId xmlns:a16="http://schemas.microsoft.com/office/drawing/2014/main" id="{E9CB325F-3F8B-26D2-69F3-656AB90DCF8A}"/>
-                </a:ext>
-              </a:extLst>
-            </p:cNvPr>
-            <p:cNvPicPr>
-              <a:picLocks noChangeAspect="1"/>
-            </p:cNvPicPr>
-            <p:nvPr/>
-          </p:nvPicPr>
-          <p:blipFill>
-            <a:blip r:embed="rId5">
-              <a:extLst>
-                <a:ext uri="{28A0092B-C50C-407E-A947-70E740481C1C}">
-                  <a14:useLocalDpi xmlns:a14="http://schemas.microsoft.com/office/drawing/2010/main" val="0"/>
-                </a:ext>
-              </a:extLst>
-            </a:blip>
-            <a:stretch>
-              <a:fillRect/>
-            </a:stretch>
-          </p:blipFill>
-          <p:spPr>
-            <a:xfrm>
-              <a:off x="8049203" y="29094106"/>
-              <a:ext cx="221136" cy="190500"/>
-            </a:xfrm>
-            <a:prstGeom prst="rect">
-              <a:avLst/>
-            </a:prstGeom>
-          </p:spPr>
-        </p:pic>
-      </p:grpSp>
-      <p:sp>
-        <p:nvSpPr>
-          <p:cNvPr id="15" name="Bar - EbA BG">
-            <a:extLst>
-              <a:ext uri="{FF2B5EF4-FFF2-40B4-BE49-F238E27FC236}">
-                <a16:creationId xmlns:a16="http://schemas.microsoft.com/office/drawing/2014/main" id="{012D96D1-4AFB-93D5-C45D-E4E7E589355D}"/>
-              </a:ext>
-            </a:extLst>
-          </p:cNvPr>
-          <p:cNvSpPr/>
-          <p:nvPr/>
-        </p:nvSpPr>
-        <p:spPr>
-          <a:xfrm>
-            <a:off x="4918070" y="23630729"/>
-            <a:ext cx="4333875" cy="2095500"/>
-          </a:xfrm>
-          <a:prstGeom prst="roundRect">
-            <a:avLst>
-              <a:gd name="adj" fmla="val 8406"/>
-            </a:avLst>
-          </a:prstGeom>
-          <a:solidFill>
-            <a:srgbClr val="0A0A0A"/>
-          </a:solidFill>
-          <a:ln>
-            <a:noFill/>
-          </a:ln>
-          <a:effectLst>
-            <a:outerShdw blurRad="38100" dist="25400" dir="13500000" algn="br" rotWithShape="0">
-              <a:srgbClr val="FFFFFA">
-                <a:alpha val="30000"/>
-              </a:srgbClr>
-            </a:outerShdw>
-            <a:softEdge rad="0"/>
-          </a:effectLst>
-        </p:spPr>
-        <p:style>
-          <a:lnRef idx="2">
-            <a:schemeClr val="accent1">
-              <a:shade val="15000"/>
-            </a:schemeClr>
-          </a:lnRef>
-          <a:fillRef idx="1">
-            <a:schemeClr val="accent1"/>
-          </a:fillRef>
-          <a:effectRef idx="0">
-            <a:schemeClr val="accent1"/>
-          </a:effectRef>
-          <a:fontRef idx="minor">
-            <a:schemeClr val="lt1"/>
-          </a:fontRef>
-        </p:style>
-        <p:txBody>
-          <a:bodyPr rtlCol="0" anchor="ctr"/>
-          <a:lstStyle/>
-          <a:p>
-            <a:pPr algn="ctr"/>
-            <a:endParaRPr lang="pl-PL"/>
-          </a:p>
-        </p:txBody>
-      </p:sp>
-      <p:sp>
-        <p:nvSpPr>
-          <p:cNvPr id="16" name="Bar - EbG BG">
-            <a:extLst>
-              <a:ext uri="{FF2B5EF4-FFF2-40B4-BE49-F238E27FC236}">
-                <a16:creationId xmlns:a16="http://schemas.microsoft.com/office/drawing/2014/main" id="{0D41AB6C-7D1A-0763-41E1-714DAD77113C}"/>
-              </a:ext>
-            </a:extLst>
-          </p:cNvPr>
-          <p:cNvSpPr/>
-          <p:nvPr/>
-        </p:nvSpPr>
-        <p:spPr>
-          <a:xfrm>
-            <a:off x="4918069" y="25869104"/>
-            <a:ext cx="4333875" cy="2857500"/>
-          </a:xfrm>
-          <a:prstGeom prst="roundRect">
-            <a:avLst>
-              <a:gd name="adj" fmla="val 8406"/>
-            </a:avLst>
-          </a:prstGeom>
-          <a:solidFill>
-            <a:srgbClr val="0A0A0A"/>
-          </a:solidFill>
-          <a:ln>
-            <a:noFill/>
-          </a:ln>
-          <a:effectLst>
-            <a:outerShdw blurRad="38100" dist="25400" dir="13500000" algn="br" rotWithShape="0">
-              <a:srgbClr val="FFFFFA">
-                <a:alpha val="30000"/>
-              </a:srgbClr>
-            </a:outerShdw>
-            <a:softEdge rad="0"/>
-          </a:effectLst>
-        </p:spPr>
-        <p:style>
-          <a:lnRef idx="2">
-            <a:schemeClr val="accent1">
-              <a:shade val="15000"/>
-            </a:schemeClr>
-          </a:lnRef>
-          <a:fillRef idx="1">
-            <a:schemeClr val="accent1"/>
-          </a:fillRef>
-          <a:effectRef idx="0">
-            <a:schemeClr val="accent1"/>
-          </a:effectRef>
-          <a:fontRef idx="minor">
-            <a:schemeClr val="lt1"/>
-          </a:fontRef>
-        </p:style>
-        <p:txBody>
-          <a:bodyPr rtlCol="0" anchor="ctr"/>
-          <a:lstStyle/>
-          <a:p>
-            <a:pPr algn="ctr"/>
-            <a:endParaRPr lang="pl-PL"/>
-          </a:p>
-        </p:txBody>
-      </p:sp>
-      <p:sp>
-        <p:nvSpPr>
-          <p:cNvPr id="13" name="Bar - EbGA BG">
-            <a:extLst>
-              <a:ext uri="{FF2B5EF4-FFF2-40B4-BE49-F238E27FC236}">
-                <a16:creationId xmlns:a16="http://schemas.microsoft.com/office/drawing/2014/main" id="{5F6ADBF3-2509-C1F9-7DCC-5F40E903A1FE}"/>
-              </a:ext>
-            </a:extLst>
-          </p:cNvPr>
-          <p:cNvSpPr/>
-          <p:nvPr/>
-        </p:nvSpPr>
-        <p:spPr>
-          <a:xfrm>
-            <a:off x="292097" y="23630729"/>
-            <a:ext cx="4333875" cy="5095875"/>
-          </a:xfrm>
-          <a:prstGeom prst="roundRect">
-            <a:avLst>
-              <a:gd name="adj" fmla="val 8406"/>
-            </a:avLst>
-          </a:prstGeom>
-          <a:solidFill>
-            <a:srgbClr val="0A0A0A"/>
-          </a:solidFill>
-          <a:ln>
-            <a:noFill/>
-          </a:ln>
-          <a:effectLst>
-            <a:outerShdw blurRad="38100" dist="25400" dir="13500000" algn="br" rotWithShape="0">
-              <a:srgbClr val="FFFFFA">
-                <a:alpha val="30000"/>
-              </a:srgbClr>
-            </a:outerShdw>
-            <a:softEdge rad="0"/>
-          </a:effectLst>
-        </p:spPr>
-        <p:style>
-          <a:lnRef idx="2">
-            <a:schemeClr val="accent1">
-              <a:shade val="15000"/>
-            </a:schemeClr>
-          </a:lnRef>
-          <a:fillRef idx="1">
-            <a:schemeClr val="accent1"/>
-          </a:fillRef>
-          <a:effectRef idx="0">
-            <a:schemeClr val="accent1"/>
-          </a:effectRef>
-          <a:fontRef idx="minor">
-            <a:schemeClr val="lt1"/>
-          </a:fontRef>
-        </p:style>
-        <p:txBody>
-          <a:bodyPr rtlCol="0" anchor="ctr"/>
-          <a:lstStyle/>
-          <a:p>
-            <a:pPr algn="ctr"/>
-            <a:endParaRPr lang="pl-PL"/>
-          </a:p>
-        </p:txBody>
-      </p:sp>
-      <p:sp>
-        <p:nvSpPr>
-          <p:cNvPr id="12" name="Box Plot - EbG BG">
-            <a:extLst>
-              <a:ext uri="{FF2B5EF4-FFF2-40B4-BE49-F238E27FC236}">
-                <a16:creationId xmlns:a16="http://schemas.microsoft.com/office/drawing/2014/main" id="{894164E8-281D-DDCA-BCAE-21DEF5A4484A}"/>
-              </a:ext>
-            </a:extLst>
-          </p:cNvPr>
-          <p:cNvSpPr/>
-          <p:nvPr/>
-        </p:nvSpPr>
-        <p:spPr>
-          <a:xfrm>
-            <a:off x="4918070" y="19324636"/>
-            <a:ext cx="4333875" cy="4000500"/>
-          </a:xfrm>
-          <a:prstGeom prst="roundRect">
-            <a:avLst>
-              <a:gd name="adj" fmla="val 8406"/>
-            </a:avLst>
-          </a:prstGeom>
-          <a:solidFill>
-            <a:srgbClr val="0A0A0A"/>
-          </a:solidFill>
-          <a:ln>
-            <a:noFill/>
-          </a:ln>
-          <a:effectLst>
-            <a:outerShdw blurRad="38100" dist="25400" dir="13500000" algn="br" rotWithShape="0">
-              <a:srgbClr val="FFFFFA">
-                <a:alpha val="30000"/>
-              </a:srgbClr>
-            </a:outerShdw>
-            <a:softEdge rad="0"/>
-          </a:effectLst>
-        </p:spPr>
-        <p:style>
-          <a:lnRef idx="2">
-            <a:schemeClr val="accent1">
-              <a:shade val="15000"/>
-            </a:schemeClr>
-          </a:lnRef>
-          <a:fillRef idx="1">
-            <a:schemeClr val="accent1"/>
-          </a:fillRef>
-          <a:effectRef idx="0">
-            <a:schemeClr val="accent1"/>
-          </a:effectRef>
-          <a:fontRef idx="minor">
-            <a:schemeClr val="lt1"/>
-          </a:fontRef>
-        </p:style>
-        <p:txBody>
-          <a:bodyPr rtlCol="0" anchor="ctr"/>
-          <a:lstStyle/>
-          <a:p>
-            <a:pPr algn="ctr"/>
-            <a:endParaRPr lang="pl-PL"/>
-          </a:p>
-        </p:txBody>
-      </p:sp>
-      <p:sp>
-        <p:nvSpPr>
-          <p:cNvPr id="11" name="Box Plot - EbA BG">
-            <a:extLst>
-              <a:ext uri="{FF2B5EF4-FFF2-40B4-BE49-F238E27FC236}">
-                <a16:creationId xmlns:a16="http://schemas.microsoft.com/office/drawing/2014/main" id="{41F2848E-E14B-E380-4244-DC1FB2CB9E01}"/>
-              </a:ext>
-            </a:extLst>
-          </p:cNvPr>
-          <p:cNvSpPr/>
-          <p:nvPr/>
-        </p:nvSpPr>
-        <p:spPr>
-          <a:xfrm>
-            <a:off x="292098" y="19324636"/>
-            <a:ext cx="4333875" cy="4000500"/>
-          </a:xfrm>
-          <a:prstGeom prst="roundRect">
-            <a:avLst>
-              <a:gd name="adj" fmla="val 8406"/>
-            </a:avLst>
-          </a:prstGeom>
-          <a:solidFill>
-            <a:srgbClr val="0A0A0A"/>
-          </a:solidFill>
-          <a:ln>
-            <a:noFill/>
-          </a:ln>
-          <a:effectLst>
-            <a:outerShdw blurRad="38100" dist="25400" dir="13500000" algn="br" rotWithShape="0">
-              <a:srgbClr val="FFFFFA">
-                <a:alpha val="30000"/>
-              </a:srgbClr>
-            </a:outerShdw>
-            <a:softEdge rad="0"/>
-          </a:effectLst>
-        </p:spPr>
-        <p:style>
-          <a:lnRef idx="2">
-            <a:schemeClr val="accent1">
-              <a:shade val="15000"/>
-            </a:schemeClr>
-          </a:lnRef>
-          <a:fillRef idx="1">
-            <a:schemeClr val="accent1"/>
-          </a:fillRef>
-          <a:effectRef idx="0">
-            <a:schemeClr val="accent1"/>
-          </a:effectRef>
-          <a:fontRef idx="minor">
-            <a:schemeClr val="lt1"/>
-          </a:fontRef>
-        </p:style>
-        <p:txBody>
-          <a:bodyPr rtlCol="0" anchor="ctr"/>
-          <a:lstStyle/>
-          <a:p>
-            <a:pPr algn="ctr"/>
-            <a:endParaRPr lang="pl-PL"/>
-          </a:p>
-        </p:txBody>
-      </p:sp>
-      <p:sp>
-        <p:nvSpPr>
-          <p:cNvPr id="10" name="Bar - EbCA BG">
-            <a:extLst>
-              <a:ext uri="{FF2B5EF4-FFF2-40B4-BE49-F238E27FC236}">
-                <a16:creationId xmlns:a16="http://schemas.microsoft.com/office/drawing/2014/main" id="{0E81DB5D-39B3-5698-1FF1-62E82575BEF1}"/>
-              </a:ext>
-            </a:extLst>
-          </p:cNvPr>
-          <p:cNvSpPr/>
-          <p:nvPr/>
-        </p:nvSpPr>
-        <p:spPr>
-          <a:xfrm>
-            <a:off x="292100" y="15049499"/>
-            <a:ext cx="8953500" cy="4000500"/>
-          </a:xfrm>
-          <a:prstGeom prst="roundRect">
-            <a:avLst>
-              <a:gd name="adj" fmla="val 8406"/>
-            </a:avLst>
-          </a:prstGeom>
-          <a:solidFill>
-            <a:srgbClr val="0A0A0A"/>
-          </a:solidFill>
-          <a:ln>
-            <a:noFill/>
-          </a:ln>
-          <a:effectLst>
-            <a:outerShdw blurRad="38100" dist="25400" dir="13500000" algn="br" rotWithShape="0">
-              <a:srgbClr val="FFFFFA">
-                <a:alpha val="30000"/>
-              </a:srgbClr>
-            </a:outerShdw>
-            <a:softEdge rad="0"/>
-          </a:effectLst>
-        </p:spPr>
-        <p:style>
-          <a:lnRef idx="2">
-            <a:schemeClr val="accent1">
-              <a:shade val="15000"/>
-            </a:schemeClr>
-          </a:lnRef>
-          <a:fillRef idx="1">
-            <a:schemeClr val="accent1"/>
-          </a:fillRef>
-          <a:effectRef idx="0">
-            <a:schemeClr val="accent1"/>
-          </a:effectRef>
-          <a:fontRef idx="minor">
-            <a:schemeClr val="lt1"/>
-          </a:fontRef>
-        </p:style>
-        <p:txBody>
-          <a:bodyPr rtlCol="0" anchor="ctr"/>
-          <a:lstStyle/>
-          <a:p>
-            <a:pPr algn="ctr"/>
-            <a:endParaRPr lang="pl-PL"/>
-          </a:p>
-        </p:txBody>
-      </p:sp>
-      <p:sp>
-        <p:nvSpPr>
-          <p:cNvPr id="9" name="Bar - EbCG BG">
-            <a:extLst>
-              <a:ext uri="{FF2B5EF4-FFF2-40B4-BE49-F238E27FC236}">
-                <a16:creationId xmlns:a16="http://schemas.microsoft.com/office/drawing/2014/main" id="{D990526A-E8A5-6E26-A439-C90B9157EA6F}"/>
-              </a:ext>
-            </a:extLst>
-          </p:cNvPr>
-          <p:cNvSpPr/>
-          <p:nvPr/>
-        </p:nvSpPr>
-        <p:spPr>
-          <a:xfrm>
-            <a:off x="279401" y="10900568"/>
-            <a:ext cx="8953500" cy="4000500"/>
-          </a:xfrm>
-          <a:prstGeom prst="roundRect">
-            <a:avLst>
-              <a:gd name="adj" fmla="val 8406"/>
-            </a:avLst>
-          </a:prstGeom>
-          <a:solidFill>
-            <a:srgbClr val="0A0A0A"/>
-          </a:solidFill>
-          <a:ln>
-            <a:noFill/>
-          </a:ln>
-          <a:effectLst>
-            <a:outerShdw blurRad="38100" dist="25400" dir="13500000" algn="br" rotWithShape="0">
-              <a:srgbClr val="FFFFFA">
-                <a:alpha val="30000"/>
-              </a:srgbClr>
-            </a:outerShdw>
-            <a:softEdge rad="0"/>
-          </a:effectLst>
-        </p:spPr>
-        <p:style>
-          <a:lnRef idx="2">
-            <a:schemeClr val="accent1">
-              <a:shade val="15000"/>
-            </a:schemeClr>
-          </a:lnRef>
-          <a:fillRef idx="1">
-            <a:schemeClr val="accent1"/>
-          </a:fillRef>
-          <a:effectRef idx="0">
-            <a:schemeClr val="accent1"/>
-          </a:effectRef>
-          <a:fontRef idx="minor">
-            <a:schemeClr val="lt1"/>
-          </a:fontRef>
-        </p:style>
-        <p:txBody>
-          <a:bodyPr rtlCol="0" anchor="ctr"/>
-          <a:lstStyle/>
-          <a:p>
-            <a:pPr algn="ctr"/>
-            <a:endParaRPr lang="pl-PL"/>
-          </a:p>
-        </p:txBody>
-      </p:sp>
-      <p:sp>
-        <p:nvSpPr>
-          <p:cNvPr id="8" name="Bar - EbC BG">
-            <a:extLst>
-              <a:ext uri="{FF2B5EF4-FFF2-40B4-BE49-F238E27FC236}">
-                <a16:creationId xmlns:a16="http://schemas.microsoft.com/office/drawing/2014/main" id="{FE93D96C-6608-5F73-813F-F422668FD7F0}"/>
-              </a:ext>
-            </a:extLst>
-          </p:cNvPr>
-          <p:cNvSpPr/>
-          <p:nvPr/>
-        </p:nvSpPr>
-        <p:spPr>
-          <a:xfrm>
-            <a:off x="292100" y="6751637"/>
-            <a:ext cx="8953500" cy="4000500"/>
-          </a:xfrm>
-          <a:prstGeom prst="roundRect">
-            <a:avLst>
-              <a:gd name="adj" fmla="val 8406"/>
-            </a:avLst>
-          </a:prstGeom>
-          <a:solidFill>
-            <a:srgbClr val="0A0A0A"/>
-          </a:solidFill>
-          <a:ln>
-            <a:noFill/>
-          </a:ln>
-          <a:effectLst>
-            <a:outerShdw blurRad="38100" dist="25400" dir="13500000" algn="br" rotWithShape="0">
-              <a:srgbClr val="FFFFFA">
-                <a:alpha val="30000"/>
-              </a:srgbClr>
-            </a:outerShdw>
-            <a:softEdge rad="0"/>
-          </a:effectLst>
-        </p:spPr>
-        <p:style>
-          <a:lnRef idx="2">
-            <a:schemeClr val="accent1">
-              <a:shade val="15000"/>
-            </a:schemeClr>
-          </a:lnRef>
-          <a:fillRef idx="1">
-            <a:schemeClr val="accent1"/>
-          </a:fillRef>
-          <a:effectRef idx="0">
-            <a:schemeClr val="accent1"/>
-          </a:effectRef>
-          <a:fontRef idx="minor">
-            <a:schemeClr val="lt1"/>
-          </a:fontRef>
-        </p:style>
-        <p:txBody>
-          <a:bodyPr rtlCol="0" anchor="ctr"/>
-          <a:lstStyle/>
-          <a:p>
-            <a:pPr algn="ctr"/>
-            <a:endParaRPr lang="pl-PL"/>
-          </a:p>
-        </p:txBody>
-      </p:sp>
-      <p:sp>
-        <p:nvSpPr>
-          <p:cNvPr id="7" name="Box Plot - E BG">
-            <a:extLst>
-              <a:ext uri="{FF2B5EF4-FFF2-40B4-BE49-F238E27FC236}">
-                <a16:creationId xmlns:a16="http://schemas.microsoft.com/office/drawing/2014/main" id="{EBE042E4-FE06-7CA7-75B6-913B053E4ED8}"/>
-              </a:ext>
-            </a:extLst>
-          </p:cNvPr>
-          <p:cNvSpPr/>
-          <p:nvPr/>
-        </p:nvSpPr>
-        <p:spPr>
-          <a:xfrm>
-            <a:off x="6299199" y="2095500"/>
-            <a:ext cx="2952750" cy="4381500"/>
-          </a:xfrm>
-          <a:prstGeom prst="roundRect">
-            <a:avLst>
-              <a:gd name="adj" fmla="val 8406"/>
-            </a:avLst>
-          </a:prstGeom>
-          <a:solidFill>
-            <a:srgbClr val="0A0A0A"/>
-          </a:solidFill>
-          <a:ln>
-            <a:noFill/>
-          </a:ln>
-          <a:effectLst>
-            <a:outerShdw blurRad="38100" dist="25400" dir="13500000" algn="br" rotWithShape="0">
-              <a:srgbClr val="FFFFFA">
-                <a:alpha val="30000"/>
-              </a:srgbClr>
-            </a:outerShdw>
-            <a:softEdge rad="0"/>
-          </a:effectLst>
-        </p:spPr>
-        <p:style>
-          <a:lnRef idx="2">
-            <a:schemeClr val="accent1">
-              <a:shade val="15000"/>
-            </a:schemeClr>
-          </a:lnRef>
-          <a:fillRef idx="1">
-            <a:schemeClr val="accent1"/>
-          </a:fillRef>
-          <a:effectRef idx="0">
-            <a:schemeClr val="accent1"/>
-          </a:effectRef>
-          <a:fontRef idx="minor">
-            <a:schemeClr val="lt1"/>
-          </a:fontRef>
-        </p:style>
-        <p:txBody>
-          <a:bodyPr rtlCol="0" anchor="ctr"/>
-          <a:lstStyle/>
-          <a:p>
-            <a:pPr algn="ctr"/>
-            <a:endParaRPr lang="pl-PL"/>
-          </a:p>
-        </p:txBody>
-      </p:sp>
-      <p:sp>
-        <p:nvSpPr>
-          <p:cNvPr id="6" name="Map - EbC BG">
-            <a:extLst>
-              <a:ext uri="{FF2B5EF4-FFF2-40B4-BE49-F238E27FC236}">
-                <a16:creationId xmlns:a16="http://schemas.microsoft.com/office/drawing/2014/main" id="{6DADB79C-D0B9-2F4B-C240-8F32EFF0ACB2}"/>
-              </a:ext>
-            </a:extLst>
-          </p:cNvPr>
-          <p:cNvSpPr/>
-          <p:nvPr/>
-        </p:nvSpPr>
-        <p:spPr>
-          <a:xfrm>
-            <a:off x="292100" y="2095500"/>
-            <a:ext cx="5715000" cy="4381500"/>
-          </a:xfrm>
-          <a:prstGeom prst="roundRect">
-            <a:avLst>
-              <a:gd name="adj" fmla="val 8406"/>
-            </a:avLst>
-          </a:prstGeom>
-          <a:solidFill>
-            <a:srgbClr val="0A0A0A"/>
-          </a:solidFill>
-          <a:ln>
-            <a:noFill/>
-          </a:ln>
-          <a:effectLst>
-            <a:outerShdw blurRad="38100" dist="25400" dir="13500000" algn="br" rotWithShape="0">
-              <a:srgbClr val="FFFFFA">
-                <a:alpha val="30000"/>
-              </a:srgbClr>
-            </a:outerShdw>
-            <a:softEdge rad="0"/>
-          </a:effectLst>
-        </p:spPr>
-        <p:style>
-          <a:lnRef idx="2">
-            <a:schemeClr val="accent1">
-              <a:shade val="15000"/>
-            </a:schemeClr>
-          </a:lnRef>
-          <a:fillRef idx="1">
-            <a:schemeClr val="accent1"/>
-          </a:fillRef>
-          <a:effectRef idx="0">
-            <a:schemeClr val="accent1"/>
-          </a:effectRef>
-          <a:fontRef idx="minor">
-            <a:schemeClr val="lt1"/>
-          </a:fontRef>
-        </p:style>
-        <p:txBody>
-          <a:bodyPr rtlCol="0" anchor="ctr"/>
-          <a:lstStyle/>
-          <a:p>
-            <a:pPr algn="ctr"/>
-            <a:endParaRPr lang="pl-PL"/>
-          </a:p>
-        </p:txBody>
-      </p:sp>
-      <p:sp>
-        <p:nvSpPr>
-          <p:cNvPr id="17" name="Slicer Pane BG">
-            <a:extLst>
-              <a:ext uri="{FF2B5EF4-FFF2-40B4-BE49-F238E27FC236}">
-                <a16:creationId xmlns:a16="http://schemas.microsoft.com/office/drawing/2014/main" id="{421C15B2-FB6F-EA1A-DD88-5D5473E695CC}"/>
-              </a:ext>
-            </a:extLst>
-          </p:cNvPr>
-          <p:cNvSpPr/>
-          <p:nvPr/>
-        </p:nvSpPr>
-        <p:spPr>
-          <a:xfrm>
-            <a:off x="142876" y="754063"/>
-            <a:ext cx="9239250" cy="1047750"/>
-          </a:xfrm>
-          <a:prstGeom prst="roundRect">
-            <a:avLst>
-              <a:gd name="adj" fmla="val 27875"/>
-            </a:avLst>
-          </a:prstGeom>
-          <a:solidFill>
-            <a:srgbClr val="0A0A0A"/>
-          </a:solidFill>
-          <a:ln>
-            <a:noFill/>
-          </a:ln>
-          <a:effectLst>
-            <a:outerShdw blurRad="38100" dist="25400" dir="13500000" algn="br" rotWithShape="0">
-              <a:srgbClr val="FFFFFA">
-                <a:alpha val="30000"/>
-              </a:srgbClr>
-            </a:outerShdw>
-            <a:softEdge rad="0"/>
-          </a:effectLst>
-        </p:spPr>
-        <p:style>
-          <a:lnRef idx="2">
-            <a:schemeClr val="accent1">
-              <a:shade val="15000"/>
-            </a:schemeClr>
-          </a:lnRef>
-          <a:fillRef idx="1">
-            <a:schemeClr val="accent1"/>
-          </a:fillRef>
-          <a:effectRef idx="0">
-            <a:schemeClr val="accent1"/>
-          </a:effectRef>
-          <a:fontRef idx="minor">
-            <a:schemeClr val="lt1"/>
-          </a:fontRef>
-        </p:style>
-        <p:txBody>
-          <a:bodyPr rtlCol="0" anchor="ctr"/>
-          <a:lstStyle/>
-          <a:p>
-            <a:pPr algn="ctr"/>
-            <a:endParaRPr lang="pl-PL"/>
-          </a:p>
-        </p:txBody>
-      </p:sp>
-      <p:sp>
-        <p:nvSpPr>
-          <p:cNvPr id="19" name="Header &amp; Nav BG">
-            <a:extLst>
-              <a:ext uri="{FF2B5EF4-FFF2-40B4-BE49-F238E27FC236}">
-                <a16:creationId xmlns:a16="http://schemas.microsoft.com/office/drawing/2014/main" id="{71CC0687-5C6B-6AC3-0E30-B0EFA4575A49}"/>
-              </a:ext>
-            </a:extLst>
-          </p:cNvPr>
-          <p:cNvSpPr/>
-          <p:nvPr/>
-        </p:nvSpPr>
-        <p:spPr>
-          <a:xfrm>
-            <a:off x="0" y="0"/>
-            <a:ext cx="9525000" cy="666750"/>
-          </a:xfrm>
-          <a:prstGeom prst="rect">
-            <a:avLst/>
-          </a:prstGeom>
-          <a:solidFill>
-            <a:srgbClr val="0A0A0A"/>
-          </a:solidFill>
-          <a:ln>
-            <a:noFill/>
-          </a:ln>
-          <a:effectLst>
-            <a:outerShdw blurRad="12700" dist="12700" dir="5400000" algn="t" rotWithShape="0">
-              <a:srgbClr val="FFFFFA">
-                <a:alpha val="20000"/>
-              </a:srgbClr>
-            </a:outerShdw>
-          </a:effectLst>
-        </p:spPr>
-        <p:style>
-          <a:lnRef idx="2">
-            <a:schemeClr val="accent1">
-              <a:shade val="15000"/>
-            </a:schemeClr>
-          </a:lnRef>
-          <a:fillRef idx="1">
-            <a:schemeClr val="accent1"/>
-          </a:fillRef>
-          <a:effectRef idx="0">
-            <a:schemeClr val="accent1"/>
-          </a:effectRef>
-          <a:fontRef idx="minor">
-            <a:schemeClr val="lt1"/>
-          </a:fontRef>
-        </p:style>
-        <p:txBody>
-          <a:bodyPr rtlCol="0" anchor="ctr"/>
-          <a:lstStyle/>
-          <a:p>
-            <a:pPr algn="ctr"/>
-            <a:endParaRPr lang="pl-PL"/>
-          </a:p>
-        </p:txBody>
-      </p:sp>
-      <p:sp>
-        <p:nvSpPr>
-          <p:cNvPr id="36" name="Overview Button">
-            <a:extLst>
-              <a:ext uri="{FF2B5EF4-FFF2-40B4-BE49-F238E27FC236}">
-                <a16:creationId xmlns:a16="http://schemas.microsoft.com/office/drawing/2014/main" id="{BA9B3771-2A75-EFA6-5422-FDF442D13B20}"/>
-              </a:ext>
-            </a:extLst>
-          </p:cNvPr>
-          <p:cNvSpPr/>
-          <p:nvPr/>
-        </p:nvSpPr>
-        <p:spPr>
-          <a:xfrm>
-            <a:off x="5932887" y="98032"/>
-            <a:ext cx="1678781" cy="459575"/>
-          </a:xfrm>
-          <a:prstGeom prst="roundRect">
-            <a:avLst/>
-          </a:prstGeom>
-        </p:spPr>
-        <p:style>
-          <a:lnRef idx="2">
-            <a:schemeClr val="accent1">
-              <a:shade val="15000"/>
-            </a:schemeClr>
-          </a:lnRef>
-          <a:fillRef idx="1">
-            <a:schemeClr val="accent1"/>
-          </a:fillRef>
-          <a:effectRef idx="0">
-            <a:schemeClr val="accent1"/>
-          </a:effectRef>
-          <a:fontRef idx="minor">
-            <a:schemeClr val="lt1"/>
-          </a:fontRef>
-        </p:style>
-        <p:txBody>
-          <a:bodyPr rtlCol="0" anchor="ctr"/>
-          <a:lstStyle/>
-          <a:p>
-            <a:pPr algn="ctr"/>
-            <a:endParaRPr lang="pl-PL"/>
-          </a:p>
-        </p:txBody>
-      </p:sp>
-      <p:sp>
-        <p:nvSpPr>
-          <p:cNvPr id="34" name="Landing Button">
-            <a:extLst>
-              <a:ext uri="{FF2B5EF4-FFF2-40B4-BE49-F238E27FC236}">
-                <a16:creationId xmlns:a16="http://schemas.microsoft.com/office/drawing/2014/main" id="{EE2E2CDA-F2A2-DD43-7926-A90DA8C05E8B}"/>
-              </a:ext>
-            </a:extLst>
-          </p:cNvPr>
-          <p:cNvSpPr/>
-          <p:nvPr/>
-        </p:nvSpPr>
-        <p:spPr>
-          <a:xfrm>
-            <a:off x="4143376" y="98032"/>
-            <a:ext cx="1678781" cy="459575"/>
-          </a:xfrm>
-          <a:prstGeom prst="roundRect">
-            <a:avLst/>
-          </a:prstGeom>
-        </p:spPr>
-        <p:style>
-          <a:lnRef idx="2">
-            <a:schemeClr val="accent1">
-              <a:shade val="15000"/>
-            </a:schemeClr>
-          </a:lnRef>
-          <a:fillRef idx="1">
-            <a:schemeClr val="accent1"/>
-          </a:fillRef>
-          <a:effectRef idx="0">
-            <a:schemeClr val="accent1"/>
-          </a:effectRef>
-          <a:fontRef idx="minor">
-            <a:schemeClr val="lt1"/>
-          </a:fontRef>
-        </p:style>
-        <p:txBody>
-          <a:bodyPr rtlCol="0" anchor="ctr"/>
-          <a:lstStyle/>
-          <a:p>
-            <a:pPr algn="ctr"/>
-            <a:endParaRPr lang="pl-PL"/>
-          </a:p>
-        </p:txBody>
-      </p:sp>
-      <p:sp>
-        <p:nvSpPr>
-          <p:cNvPr id="35" name="Occupation Button">
-            <a:extLst>
-              <a:ext uri="{FF2B5EF4-FFF2-40B4-BE49-F238E27FC236}">
-                <a16:creationId xmlns:a16="http://schemas.microsoft.com/office/drawing/2014/main" id="{CC6C60F4-3049-552F-777F-AA1530A3A607}"/>
-              </a:ext>
-            </a:extLst>
-          </p:cNvPr>
-          <p:cNvSpPr/>
-          <p:nvPr/>
-        </p:nvSpPr>
-        <p:spPr>
-          <a:xfrm>
-            <a:off x="7721601" y="105975"/>
-            <a:ext cx="1678781" cy="459575"/>
-          </a:xfrm>
-          <a:prstGeom prst="roundRect">
-            <a:avLst/>
-          </a:prstGeom>
-        </p:spPr>
-        <p:style>
-          <a:lnRef idx="2">
-            <a:schemeClr val="accent1">
-              <a:shade val="15000"/>
-            </a:schemeClr>
-          </a:lnRef>
-          <a:fillRef idx="1">
-            <a:schemeClr val="accent1"/>
-          </a:fillRef>
-          <a:effectRef idx="0">
-            <a:schemeClr val="accent1"/>
-          </a:effectRef>
-          <a:fontRef idx="minor">
-            <a:schemeClr val="lt1"/>
-          </a:fontRef>
-        </p:style>
-        <p:txBody>
-          <a:bodyPr rtlCol="0" anchor="ctr"/>
-          <a:lstStyle/>
-          <a:p>
-            <a:pPr algn="ctr"/>
-            <a:endParaRPr lang="pl-PL"/>
-          </a:p>
-        </p:txBody>
-      </p:sp>
-      <p:pic>
-        <p:nvPicPr>
-          <p:cNvPr id="5" name="Picture 4" descr="A screenshot of a graph&#10;&#10;Description automatically generated">
-            <a:extLst>
-              <a:ext uri="{FF2B5EF4-FFF2-40B4-BE49-F238E27FC236}">
-                <a16:creationId xmlns:a16="http://schemas.microsoft.com/office/drawing/2014/main" id="{38C3D90F-3481-2DB7-5351-B79A1A42DB1B}"/>
-              </a:ext>
-            </a:extLst>
-          </p:cNvPr>
-          <p:cNvPicPr>
-            <a:picLocks noChangeAspect="1"/>
-          </p:cNvPicPr>
-          <p:nvPr/>
-        </p:nvPicPr>
-        <p:blipFill>
-          <a:blip r:embed="rId6">
-            <a:alphaModFix amt="20000"/>
-            <a:extLst>
-              <a:ext uri="{28A0092B-C50C-407E-A947-70E740481C1C}">
-                <a14:useLocalDpi xmlns:a14="http://schemas.microsoft.com/office/drawing/2010/main" val="0"/>
-              </a:ext>
-            </a:extLst>
-          </a:blip>
-          <a:stretch>
-            <a:fillRect/>
-          </a:stretch>
-        </p:blipFill>
-        <p:spPr>
-          <a:xfrm>
-            <a:off x="1" y="3"/>
-            <a:ext cx="9525000" cy="29384622"/>
-          </a:xfrm>
-          <a:prstGeom prst="rect">
-            <a:avLst/>
-          </a:prstGeom>
-        </p:spPr>
-      </p:pic>
-    </p:spTree>
-    <p:extLst>
-      <p:ext uri="{BB962C8B-B14F-4D97-AF65-F5344CB8AC3E}">
-        <p14:creationId xmlns:p14="http://schemas.microsoft.com/office/powerpoint/2010/main" val="866568064"/>
-      </p:ext>
-    </p:extLst>
-  </p:cSld>
-  <p:clrMapOvr>
-    <a:masterClrMapping/>
-  </p:clrMapOvr>
-</p:sld>
-</file>
-
-<file path=ppt/slides/slide2.xml><?xml version="1.0" encoding="utf-8"?>
 <p:sld xmlns:a="http://schemas.openxmlformats.org/drawingml/2006/main" xmlns:r="http://schemas.openxmlformats.org/officeDocument/2006/relationships" xmlns:p="http://schemas.openxmlformats.org/presentationml/2006/main">
   <p:cSld>
     <p:bg>

</xml_diff>